<commit_message>
Added new image for config
</commit_message>
<xml_diff>
--- a/pictures/UnusedFigures/DroneConfigs.pptx
+++ b/pictures/UnusedFigures/DroneConfigs.pptx
@@ -288,7 +288,7 @@
           <a:p>
             <a:fld id="{E03162C6-0571-EE4A-B6AC-459411ED4CBB}" type="datetimeFigureOut">
               <a:rPr lang="en-US" smtClean="0"/>
-              <a:t>3/1/16</a:t>
+              <a:t>9/13/16</a:t>
             </a:fld>
             <a:endParaRPr lang="en-US"/>
           </a:p>
@@ -458,7 +458,7 @@
           <a:p>
             <a:fld id="{E03162C6-0571-EE4A-B6AC-459411ED4CBB}" type="datetimeFigureOut">
               <a:rPr lang="en-US" smtClean="0"/>
-              <a:t>3/1/16</a:t>
+              <a:t>9/13/16</a:t>
             </a:fld>
             <a:endParaRPr lang="en-US"/>
           </a:p>
@@ -638,7 +638,7 @@
           <a:p>
             <a:fld id="{E03162C6-0571-EE4A-B6AC-459411ED4CBB}" type="datetimeFigureOut">
               <a:rPr lang="en-US" smtClean="0"/>
-              <a:t>3/1/16</a:t>
+              <a:t>9/13/16</a:t>
             </a:fld>
             <a:endParaRPr lang="en-US"/>
           </a:p>
@@ -808,7 +808,7 @@
           <a:p>
             <a:fld id="{E03162C6-0571-EE4A-B6AC-459411ED4CBB}" type="datetimeFigureOut">
               <a:rPr lang="en-US" smtClean="0"/>
-              <a:t>3/1/16</a:t>
+              <a:t>9/13/16</a:t>
             </a:fld>
             <a:endParaRPr lang="en-US"/>
           </a:p>
@@ -1054,7 +1054,7 @@
           <a:p>
             <a:fld id="{E03162C6-0571-EE4A-B6AC-459411ED4CBB}" type="datetimeFigureOut">
               <a:rPr lang="en-US" smtClean="0"/>
-              <a:t>3/1/16</a:t>
+              <a:t>9/13/16</a:t>
             </a:fld>
             <a:endParaRPr lang="en-US"/>
           </a:p>
@@ -1342,7 +1342,7 @@
           <a:p>
             <a:fld id="{E03162C6-0571-EE4A-B6AC-459411ED4CBB}" type="datetimeFigureOut">
               <a:rPr lang="en-US" smtClean="0"/>
-              <a:t>3/1/16</a:t>
+              <a:t>9/13/16</a:t>
             </a:fld>
             <a:endParaRPr lang="en-US"/>
           </a:p>
@@ -1764,7 +1764,7 @@
           <a:p>
             <a:fld id="{E03162C6-0571-EE4A-B6AC-459411ED4CBB}" type="datetimeFigureOut">
               <a:rPr lang="en-US" smtClean="0"/>
-              <a:t>3/1/16</a:t>
+              <a:t>9/13/16</a:t>
             </a:fld>
             <a:endParaRPr lang="en-US"/>
           </a:p>
@@ -1882,7 +1882,7 @@
           <a:p>
             <a:fld id="{E03162C6-0571-EE4A-B6AC-459411ED4CBB}" type="datetimeFigureOut">
               <a:rPr lang="en-US" smtClean="0"/>
-              <a:t>3/1/16</a:t>
+              <a:t>9/13/16</a:t>
             </a:fld>
             <a:endParaRPr lang="en-US"/>
           </a:p>
@@ -1977,7 +1977,7 @@
           <a:p>
             <a:fld id="{E03162C6-0571-EE4A-B6AC-459411ED4CBB}" type="datetimeFigureOut">
               <a:rPr lang="en-US" smtClean="0"/>
-              <a:t>3/1/16</a:t>
+              <a:t>9/13/16</a:t>
             </a:fld>
             <a:endParaRPr lang="en-US"/>
           </a:p>
@@ -2254,7 +2254,7 @@
           <a:p>
             <a:fld id="{E03162C6-0571-EE4A-B6AC-459411ED4CBB}" type="datetimeFigureOut">
               <a:rPr lang="en-US" smtClean="0"/>
-              <a:t>3/1/16</a:t>
+              <a:t>9/13/16</a:t>
             </a:fld>
             <a:endParaRPr lang="en-US"/>
           </a:p>
@@ -2507,7 +2507,7 @@
           <a:p>
             <a:fld id="{E03162C6-0571-EE4A-B6AC-459411ED4CBB}" type="datetimeFigureOut">
               <a:rPr lang="en-US" smtClean="0"/>
-              <a:t>3/1/16</a:t>
+              <a:t>9/13/16</a:t>
             </a:fld>
             <a:endParaRPr lang="en-US"/>
           </a:p>
@@ -2720,7 +2720,7 @@
           <a:p>
             <a:fld id="{E03162C6-0571-EE4A-B6AC-459411ED4CBB}" type="datetimeFigureOut">
               <a:rPr lang="en-US" smtClean="0"/>
-              <a:t>3/1/16</a:t>
+              <a:t>9/13/16</a:t>
             </a:fld>
             <a:endParaRPr lang="en-US"/>
           </a:p>
@@ -3103,8 +3103,8 @@
         </p:nvSpPr>
         <p:spPr>
           <a:xfrm>
-            <a:off x="2194560" y="2468880"/>
-            <a:ext cx="5913120" cy="2783840"/>
+            <a:off x="2854947" y="1893158"/>
+            <a:ext cx="5318098" cy="2783840"/>
           </a:xfrm>
           <a:custGeom>
             <a:avLst/>
@@ -3122,6 +3122,118 @@
               <a:gd name="connsiteX5" fmla="*/ 5913120 w 5913120"/>
               <a:gd name="connsiteY5" fmla="*/ 2600960 h 2783840"/>
               <a:gd name="connsiteX6" fmla="*/ 5902960 w 5913120"/>
+              <a:gd name="connsiteY6" fmla="*/ 0 h 2783840"/>
+              <a:gd name="connsiteX0" fmla="*/ 4826484 w 5913120"/>
+              <a:gd name="connsiteY0" fmla="*/ 0 h 2783840"/>
+              <a:gd name="connsiteX1" fmla="*/ 2651760 w 5913120"/>
+              <a:gd name="connsiteY1" fmla="*/ 10160 h 2783840"/>
+              <a:gd name="connsiteX2" fmla="*/ 0 w 5913120"/>
+              <a:gd name="connsiteY2" fmla="*/ 1381760 h 2783840"/>
+              <a:gd name="connsiteX3" fmla="*/ 2286000 w 5913120"/>
+              <a:gd name="connsiteY3" fmla="*/ 2783840 h 2783840"/>
+              <a:gd name="connsiteX4" fmla="*/ 2682240 w 5913120"/>
+              <a:gd name="connsiteY4" fmla="*/ 2600960 h 2783840"/>
+              <a:gd name="connsiteX5" fmla="*/ 5913120 w 5913120"/>
+              <a:gd name="connsiteY5" fmla="*/ 2600960 h 2783840"/>
+              <a:gd name="connsiteX6" fmla="*/ 4826484 w 5913120"/>
+              <a:gd name="connsiteY6" fmla="*/ 0 h 2783840"/>
+              <a:gd name="connsiteX0" fmla="*/ 4826484 w 4836644"/>
+              <a:gd name="connsiteY0" fmla="*/ 0 h 2783840"/>
+              <a:gd name="connsiteX1" fmla="*/ 2651760 w 4836644"/>
+              <a:gd name="connsiteY1" fmla="*/ 10160 h 2783840"/>
+              <a:gd name="connsiteX2" fmla="*/ 0 w 4836644"/>
+              <a:gd name="connsiteY2" fmla="*/ 1381760 h 2783840"/>
+              <a:gd name="connsiteX3" fmla="*/ 2286000 w 4836644"/>
+              <a:gd name="connsiteY3" fmla="*/ 2783840 h 2783840"/>
+              <a:gd name="connsiteX4" fmla="*/ 2682240 w 4836644"/>
+              <a:gd name="connsiteY4" fmla="*/ 2600960 h 2783840"/>
+              <a:gd name="connsiteX5" fmla="*/ 4836644 w 4836644"/>
+              <a:gd name="connsiteY5" fmla="*/ 2600960 h 2783840"/>
+              <a:gd name="connsiteX6" fmla="*/ 4826484 w 4836644"/>
+              <a:gd name="connsiteY6" fmla="*/ 0 h 2783840"/>
+              <a:gd name="connsiteX0" fmla="*/ 5707017 w 5707026"/>
+              <a:gd name="connsiteY0" fmla="*/ 0 h 2783840"/>
+              <a:gd name="connsiteX1" fmla="*/ 2651760 w 5707026"/>
+              <a:gd name="connsiteY1" fmla="*/ 10160 h 2783840"/>
+              <a:gd name="connsiteX2" fmla="*/ 0 w 5707026"/>
+              <a:gd name="connsiteY2" fmla="*/ 1381760 h 2783840"/>
+              <a:gd name="connsiteX3" fmla="*/ 2286000 w 5707026"/>
+              <a:gd name="connsiteY3" fmla="*/ 2783840 h 2783840"/>
+              <a:gd name="connsiteX4" fmla="*/ 2682240 w 5707026"/>
+              <a:gd name="connsiteY4" fmla="*/ 2600960 h 2783840"/>
+              <a:gd name="connsiteX5" fmla="*/ 4836644 w 5707026"/>
+              <a:gd name="connsiteY5" fmla="*/ 2600960 h 2783840"/>
+              <a:gd name="connsiteX6" fmla="*/ 5707017 w 5707026"/>
+              <a:gd name="connsiteY6" fmla="*/ 0 h 2783840"/>
+              <a:gd name="connsiteX0" fmla="*/ 5707017 w 5734111"/>
+              <a:gd name="connsiteY0" fmla="*/ 0 h 2783840"/>
+              <a:gd name="connsiteX1" fmla="*/ 2651760 w 5734111"/>
+              <a:gd name="connsiteY1" fmla="*/ 10160 h 2783840"/>
+              <a:gd name="connsiteX2" fmla="*/ 0 w 5734111"/>
+              <a:gd name="connsiteY2" fmla="*/ 1381760 h 2783840"/>
+              <a:gd name="connsiteX3" fmla="*/ 2286000 w 5734111"/>
+              <a:gd name="connsiteY3" fmla="*/ 2783840 h 2783840"/>
+              <a:gd name="connsiteX4" fmla="*/ 2682240 w 5734111"/>
+              <a:gd name="connsiteY4" fmla="*/ 2600960 h 2783840"/>
+              <a:gd name="connsiteX5" fmla="*/ 5734111 w 5734111"/>
+              <a:gd name="connsiteY5" fmla="*/ 2617893 h 2783840"/>
+              <a:gd name="connsiteX6" fmla="*/ 5707017 w 5734111"/>
+              <a:gd name="connsiteY6" fmla="*/ 0 h 2783840"/>
+              <a:gd name="connsiteX0" fmla="*/ 5317550 w 5734111"/>
+              <a:gd name="connsiteY0" fmla="*/ 0 h 2783840"/>
+              <a:gd name="connsiteX1" fmla="*/ 2651760 w 5734111"/>
+              <a:gd name="connsiteY1" fmla="*/ 10160 h 2783840"/>
+              <a:gd name="connsiteX2" fmla="*/ 0 w 5734111"/>
+              <a:gd name="connsiteY2" fmla="*/ 1381760 h 2783840"/>
+              <a:gd name="connsiteX3" fmla="*/ 2286000 w 5734111"/>
+              <a:gd name="connsiteY3" fmla="*/ 2783840 h 2783840"/>
+              <a:gd name="connsiteX4" fmla="*/ 2682240 w 5734111"/>
+              <a:gd name="connsiteY4" fmla="*/ 2600960 h 2783840"/>
+              <a:gd name="connsiteX5" fmla="*/ 5734111 w 5734111"/>
+              <a:gd name="connsiteY5" fmla="*/ 2617893 h 2783840"/>
+              <a:gd name="connsiteX6" fmla="*/ 5317550 w 5734111"/>
+              <a:gd name="connsiteY6" fmla="*/ 0 h 2783840"/>
+              <a:gd name="connsiteX0" fmla="*/ 5317550 w 5318098"/>
+              <a:gd name="connsiteY0" fmla="*/ 0 h 2783840"/>
+              <a:gd name="connsiteX1" fmla="*/ 2651760 w 5318098"/>
+              <a:gd name="connsiteY1" fmla="*/ 10160 h 2783840"/>
+              <a:gd name="connsiteX2" fmla="*/ 0 w 5318098"/>
+              <a:gd name="connsiteY2" fmla="*/ 1381760 h 2783840"/>
+              <a:gd name="connsiteX3" fmla="*/ 2286000 w 5318098"/>
+              <a:gd name="connsiteY3" fmla="*/ 2783840 h 2783840"/>
+              <a:gd name="connsiteX4" fmla="*/ 2682240 w 5318098"/>
+              <a:gd name="connsiteY4" fmla="*/ 2600960 h 2783840"/>
+              <a:gd name="connsiteX5" fmla="*/ 5310778 w 5318098"/>
+              <a:gd name="connsiteY5" fmla="*/ 2634826 h 2783840"/>
+              <a:gd name="connsiteX6" fmla="*/ 5317550 w 5318098"/>
+              <a:gd name="connsiteY6" fmla="*/ 0 h 2783840"/>
+              <a:gd name="connsiteX0" fmla="*/ 5317550 w 5318098"/>
+              <a:gd name="connsiteY0" fmla="*/ 0 h 2783840"/>
+              <a:gd name="connsiteX1" fmla="*/ 2651760 w 5318098"/>
+              <a:gd name="connsiteY1" fmla="*/ 10160 h 2783840"/>
+              <a:gd name="connsiteX2" fmla="*/ 0 w 5318098"/>
+              <a:gd name="connsiteY2" fmla="*/ 1381760 h 2783840"/>
+              <a:gd name="connsiteX3" fmla="*/ 2286000 w 5318098"/>
+              <a:gd name="connsiteY3" fmla="*/ 2783840 h 2783840"/>
+              <a:gd name="connsiteX4" fmla="*/ 2682240 w 5318098"/>
+              <a:gd name="connsiteY4" fmla="*/ 2600960 h 2783840"/>
+              <a:gd name="connsiteX5" fmla="*/ 5310778 w 5318098"/>
+              <a:gd name="connsiteY5" fmla="*/ 2619885 h 2783840"/>
+              <a:gd name="connsiteX6" fmla="*/ 5317550 w 5318098"/>
+              <a:gd name="connsiteY6" fmla="*/ 0 h 2783840"/>
+              <a:gd name="connsiteX0" fmla="*/ 5317550 w 5318098"/>
+              <a:gd name="connsiteY0" fmla="*/ 0 h 2783840"/>
+              <a:gd name="connsiteX1" fmla="*/ 2651760 w 5318098"/>
+              <a:gd name="connsiteY1" fmla="*/ 10160 h 2783840"/>
+              <a:gd name="connsiteX2" fmla="*/ 0 w 5318098"/>
+              <a:gd name="connsiteY2" fmla="*/ 1381760 h 2783840"/>
+              <a:gd name="connsiteX3" fmla="*/ 2286000 w 5318098"/>
+              <a:gd name="connsiteY3" fmla="*/ 2783840 h 2783840"/>
+              <a:gd name="connsiteX4" fmla="*/ 2637417 w 5318098"/>
+              <a:gd name="connsiteY4" fmla="*/ 2600960 h 2783840"/>
+              <a:gd name="connsiteX5" fmla="*/ 5310778 w 5318098"/>
+              <a:gd name="connsiteY5" fmla="*/ 2619885 h 2783840"/>
+              <a:gd name="connsiteX6" fmla="*/ 5317550 w 5318098"/>
               <a:gd name="connsiteY6" fmla="*/ 0 h 2783840"/>
             </a:gdLst>
             <a:ahLst/>
@@ -3150,9 +3262,9 @@
             </a:cxnLst>
             <a:rect l="l" t="t" r="r" b="b"/>
             <a:pathLst>
-              <a:path w="5913120" h="2783840">
+              <a:path w="5318098" h="2783840">
                 <a:moveTo>
-                  <a:pt x="5902960" y="0"/>
+                  <a:pt x="5317550" y="0"/>
                 </a:moveTo>
                 <a:lnTo>
                   <a:pt x="2651760" y="10160"/>
@@ -3164,15 +3276,15 @@
                   <a:pt x="2286000" y="2783840"/>
                 </a:lnTo>
                 <a:lnTo>
-                  <a:pt x="2682240" y="2600960"/>
+                  <a:pt x="2637417" y="2600960"/>
                 </a:lnTo>
                 <a:lnTo>
-                  <a:pt x="5913120" y="2600960"/>
+                  <a:pt x="5310778" y="2619885"/>
                 </a:lnTo>
                 <a:cubicBezTo>
-                  <a:pt x="5909733" y="1730587"/>
-                  <a:pt x="5906347" y="860213"/>
-                  <a:pt x="5902960" y="0"/>
+                  <a:pt x="5307391" y="1749512"/>
+                  <a:pt x="5320937" y="860213"/>
+                  <a:pt x="5317550" y="0"/>
                 </a:cubicBezTo>
                 <a:close/>
               </a:path>
@@ -3202,6 +3314,1257 @@
           </a:p>
         </p:txBody>
       </p:sp>
+      <p:grpSp>
+        <p:nvGrpSpPr>
+          <p:cNvPr id="31" name="Group 30"/>
+          <p:cNvGrpSpPr/>
+          <p:nvPr/>
+        </p:nvGrpSpPr>
+        <p:grpSpPr>
+          <a:xfrm>
+            <a:off x="3253440" y="2306409"/>
+            <a:ext cx="4683212" cy="1338426"/>
+            <a:chOff x="3253440" y="2306409"/>
+            <a:chExt cx="4683212" cy="1338426"/>
+          </a:xfrm>
+        </p:grpSpPr>
+        <p:sp>
+          <p:nvSpPr>
+            <p:cNvPr id="11" name="Oval 10"/>
+            <p:cNvSpPr/>
+            <p:nvPr/>
+          </p:nvSpPr>
+          <p:spPr>
+            <a:xfrm>
+              <a:off x="7890933" y="2310640"/>
+              <a:ext cx="45719" cy="45719"/>
+            </a:xfrm>
+            <a:prstGeom prst="ellipse">
+              <a:avLst/>
+            </a:prstGeom>
+          </p:spPr>
+          <p:style>
+            <a:lnRef idx="1">
+              <a:schemeClr val="accent2"/>
+            </a:lnRef>
+            <a:fillRef idx="3">
+              <a:schemeClr val="accent2"/>
+            </a:fillRef>
+            <a:effectRef idx="2">
+              <a:schemeClr val="accent2"/>
+            </a:effectRef>
+            <a:fontRef idx="minor">
+              <a:schemeClr val="lt1"/>
+            </a:fontRef>
+          </p:style>
+          <p:txBody>
+            <a:bodyPr rtlCol="0" anchor="ctr"/>
+            <a:lstStyle/>
+            <a:p>
+              <a:pPr algn="ctr"/>
+              <a:endParaRPr lang="en-US"/>
+            </a:p>
+          </p:txBody>
+        </p:sp>
+        <p:sp>
+          <p:nvSpPr>
+            <p:cNvPr id="67" name="Oval 66"/>
+            <p:cNvSpPr/>
+            <p:nvPr/>
+          </p:nvSpPr>
+          <p:spPr>
+            <a:xfrm>
+              <a:off x="7890933" y="2669620"/>
+              <a:ext cx="45719" cy="45719"/>
+            </a:xfrm>
+            <a:prstGeom prst="ellipse">
+              <a:avLst/>
+            </a:prstGeom>
+          </p:spPr>
+          <p:style>
+            <a:lnRef idx="1">
+              <a:schemeClr val="accent2"/>
+            </a:lnRef>
+            <a:fillRef idx="3">
+              <a:schemeClr val="accent2"/>
+            </a:fillRef>
+            <a:effectRef idx="2">
+              <a:schemeClr val="accent2"/>
+            </a:effectRef>
+            <a:fontRef idx="minor">
+              <a:schemeClr val="lt1"/>
+            </a:fontRef>
+          </p:style>
+          <p:txBody>
+            <a:bodyPr rtlCol="0" anchor="ctr"/>
+            <a:lstStyle/>
+            <a:p>
+              <a:pPr algn="ctr"/>
+              <a:endParaRPr lang="en-US"/>
+            </a:p>
+          </p:txBody>
+        </p:sp>
+        <p:sp>
+          <p:nvSpPr>
+            <p:cNvPr id="74" name="Oval 73"/>
+            <p:cNvSpPr/>
+            <p:nvPr/>
+          </p:nvSpPr>
+          <p:spPr>
+            <a:xfrm>
+              <a:off x="7504199" y="2310640"/>
+              <a:ext cx="45719" cy="45719"/>
+            </a:xfrm>
+            <a:prstGeom prst="ellipse">
+              <a:avLst/>
+            </a:prstGeom>
+          </p:spPr>
+          <p:style>
+            <a:lnRef idx="1">
+              <a:schemeClr val="accent2"/>
+            </a:lnRef>
+            <a:fillRef idx="3">
+              <a:schemeClr val="accent2"/>
+            </a:fillRef>
+            <a:effectRef idx="2">
+              <a:schemeClr val="accent2"/>
+            </a:effectRef>
+            <a:fontRef idx="minor">
+              <a:schemeClr val="lt1"/>
+            </a:fontRef>
+          </p:style>
+          <p:txBody>
+            <a:bodyPr rtlCol="0" anchor="ctr"/>
+            <a:lstStyle/>
+            <a:p>
+              <a:pPr algn="ctr"/>
+              <a:endParaRPr lang="en-US"/>
+            </a:p>
+          </p:txBody>
+        </p:sp>
+        <p:sp>
+          <p:nvSpPr>
+            <p:cNvPr id="75" name="Oval 74"/>
+            <p:cNvSpPr/>
+            <p:nvPr/>
+          </p:nvSpPr>
+          <p:spPr>
+            <a:xfrm>
+              <a:off x="7504199" y="2669620"/>
+              <a:ext cx="45719" cy="45719"/>
+            </a:xfrm>
+            <a:prstGeom prst="ellipse">
+              <a:avLst/>
+            </a:prstGeom>
+          </p:spPr>
+          <p:style>
+            <a:lnRef idx="1">
+              <a:schemeClr val="accent2"/>
+            </a:lnRef>
+            <a:fillRef idx="3">
+              <a:schemeClr val="accent2"/>
+            </a:fillRef>
+            <a:effectRef idx="2">
+              <a:schemeClr val="accent2"/>
+            </a:effectRef>
+            <a:fontRef idx="minor">
+              <a:schemeClr val="lt1"/>
+            </a:fontRef>
+          </p:style>
+          <p:txBody>
+            <a:bodyPr rtlCol="0" anchor="ctr"/>
+            <a:lstStyle/>
+            <a:p>
+              <a:pPr algn="ctr"/>
+              <a:endParaRPr lang="en-US"/>
+            </a:p>
+          </p:txBody>
+        </p:sp>
+        <p:sp>
+          <p:nvSpPr>
+            <p:cNvPr id="82" name="Oval 81"/>
+            <p:cNvSpPr/>
+            <p:nvPr/>
+          </p:nvSpPr>
+          <p:spPr>
+            <a:xfrm>
+              <a:off x="7117465" y="2310640"/>
+              <a:ext cx="45719" cy="45719"/>
+            </a:xfrm>
+            <a:prstGeom prst="ellipse">
+              <a:avLst/>
+            </a:prstGeom>
+          </p:spPr>
+          <p:style>
+            <a:lnRef idx="1">
+              <a:schemeClr val="accent2"/>
+            </a:lnRef>
+            <a:fillRef idx="3">
+              <a:schemeClr val="accent2"/>
+            </a:fillRef>
+            <a:effectRef idx="2">
+              <a:schemeClr val="accent2"/>
+            </a:effectRef>
+            <a:fontRef idx="minor">
+              <a:schemeClr val="lt1"/>
+            </a:fontRef>
+          </p:style>
+          <p:txBody>
+            <a:bodyPr rtlCol="0" anchor="ctr"/>
+            <a:lstStyle/>
+            <a:p>
+              <a:pPr algn="ctr"/>
+              <a:endParaRPr lang="en-US"/>
+            </a:p>
+          </p:txBody>
+        </p:sp>
+        <p:sp>
+          <p:nvSpPr>
+            <p:cNvPr id="85" name="Oval 84"/>
+            <p:cNvSpPr/>
+            <p:nvPr/>
+          </p:nvSpPr>
+          <p:spPr>
+            <a:xfrm>
+              <a:off x="7117465" y="2669620"/>
+              <a:ext cx="45719" cy="45719"/>
+            </a:xfrm>
+            <a:prstGeom prst="ellipse">
+              <a:avLst/>
+            </a:prstGeom>
+          </p:spPr>
+          <p:style>
+            <a:lnRef idx="1">
+              <a:schemeClr val="accent2"/>
+            </a:lnRef>
+            <a:fillRef idx="3">
+              <a:schemeClr val="accent2"/>
+            </a:fillRef>
+            <a:effectRef idx="2">
+              <a:schemeClr val="accent2"/>
+            </a:effectRef>
+            <a:fontRef idx="minor">
+              <a:schemeClr val="lt1"/>
+            </a:fontRef>
+          </p:style>
+          <p:txBody>
+            <a:bodyPr rtlCol="0" anchor="ctr"/>
+            <a:lstStyle/>
+            <a:p>
+              <a:pPr algn="ctr"/>
+              <a:endParaRPr lang="en-US"/>
+            </a:p>
+          </p:txBody>
+        </p:sp>
+        <p:sp>
+          <p:nvSpPr>
+            <p:cNvPr id="89" name="Oval 88"/>
+            <p:cNvSpPr/>
+            <p:nvPr/>
+          </p:nvSpPr>
+          <p:spPr>
+            <a:xfrm>
+              <a:off x="6730731" y="2310640"/>
+              <a:ext cx="45719" cy="45719"/>
+            </a:xfrm>
+            <a:prstGeom prst="ellipse">
+              <a:avLst/>
+            </a:prstGeom>
+          </p:spPr>
+          <p:style>
+            <a:lnRef idx="1">
+              <a:schemeClr val="accent2"/>
+            </a:lnRef>
+            <a:fillRef idx="3">
+              <a:schemeClr val="accent2"/>
+            </a:fillRef>
+            <a:effectRef idx="2">
+              <a:schemeClr val="accent2"/>
+            </a:effectRef>
+            <a:fontRef idx="minor">
+              <a:schemeClr val="lt1"/>
+            </a:fontRef>
+          </p:style>
+          <p:txBody>
+            <a:bodyPr rtlCol="0" anchor="ctr"/>
+            <a:lstStyle/>
+            <a:p>
+              <a:pPr algn="ctr"/>
+              <a:endParaRPr lang="en-US"/>
+            </a:p>
+          </p:txBody>
+        </p:sp>
+        <p:sp>
+          <p:nvSpPr>
+            <p:cNvPr id="91" name="Oval 90"/>
+            <p:cNvSpPr/>
+            <p:nvPr/>
+          </p:nvSpPr>
+          <p:spPr>
+            <a:xfrm>
+              <a:off x="6730731" y="2669620"/>
+              <a:ext cx="45719" cy="45719"/>
+            </a:xfrm>
+            <a:prstGeom prst="ellipse">
+              <a:avLst/>
+            </a:prstGeom>
+          </p:spPr>
+          <p:style>
+            <a:lnRef idx="1">
+              <a:schemeClr val="accent2"/>
+            </a:lnRef>
+            <a:fillRef idx="3">
+              <a:schemeClr val="accent2"/>
+            </a:fillRef>
+            <a:effectRef idx="2">
+              <a:schemeClr val="accent2"/>
+            </a:effectRef>
+            <a:fontRef idx="minor">
+              <a:schemeClr val="lt1"/>
+            </a:fontRef>
+          </p:style>
+          <p:txBody>
+            <a:bodyPr rtlCol="0" anchor="ctr"/>
+            <a:lstStyle/>
+            <a:p>
+              <a:pPr algn="ctr"/>
+              <a:endParaRPr lang="en-US"/>
+            </a:p>
+          </p:txBody>
+        </p:sp>
+        <p:sp>
+          <p:nvSpPr>
+            <p:cNvPr id="100" name="Oval 99"/>
+            <p:cNvSpPr/>
+            <p:nvPr/>
+          </p:nvSpPr>
+          <p:spPr>
+            <a:xfrm>
+              <a:off x="6347312" y="2306409"/>
+              <a:ext cx="45719" cy="45719"/>
+            </a:xfrm>
+            <a:prstGeom prst="ellipse">
+              <a:avLst/>
+            </a:prstGeom>
+          </p:spPr>
+          <p:style>
+            <a:lnRef idx="1">
+              <a:schemeClr val="accent2"/>
+            </a:lnRef>
+            <a:fillRef idx="3">
+              <a:schemeClr val="accent2"/>
+            </a:fillRef>
+            <a:effectRef idx="2">
+              <a:schemeClr val="accent2"/>
+            </a:effectRef>
+            <a:fontRef idx="minor">
+              <a:schemeClr val="lt1"/>
+            </a:fontRef>
+          </p:style>
+          <p:txBody>
+            <a:bodyPr rtlCol="0" anchor="ctr"/>
+            <a:lstStyle/>
+            <a:p>
+              <a:pPr algn="ctr"/>
+              <a:endParaRPr lang="en-US"/>
+            </a:p>
+          </p:txBody>
+        </p:sp>
+        <p:sp>
+          <p:nvSpPr>
+            <p:cNvPr id="101" name="Oval 100"/>
+            <p:cNvSpPr/>
+            <p:nvPr/>
+          </p:nvSpPr>
+          <p:spPr>
+            <a:xfrm>
+              <a:off x="6347312" y="2665389"/>
+              <a:ext cx="45719" cy="45719"/>
+            </a:xfrm>
+            <a:prstGeom prst="ellipse">
+              <a:avLst/>
+            </a:prstGeom>
+          </p:spPr>
+          <p:style>
+            <a:lnRef idx="1">
+              <a:schemeClr val="accent2"/>
+            </a:lnRef>
+            <a:fillRef idx="3">
+              <a:schemeClr val="accent2"/>
+            </a:fillRef>
+            <a:effectRef idx="2">
+              <a:schemeClr val="accent2"/>
+            </a:effectRef>
+            <a:fontRef idx="minor">
+              <a:schemeClr val="lt1"/>
+            </a:fontRef>
+          </p:style>
+          <p:txBody>
+            <a:bodyPr rtlCol="0" anchor="ctr"/>
+            <a:lstStyle/>
+            <a:p>
+              <a:pPr algn="ctr"/>
+              <a:endParaRPr lang="en-US"/>
+            </a:p>
+          </p:txBody>
+        </p:sp>
+        <p:sp>
+          <p:nvSpPr>
+            <p:cNvPr id="104" name="Oval 103"/>
+            <p:cNvSpPr/>
+            <p:nvPr/>
+          </p:nvSpPr>
+          <p:spPr>
+            <a:xfrm>
+              <a:off x="5960578" y="2306409"/>
+              <a:ext cx="45719" cy="45719"/>
+            </a:xfrm>
+            <a:prstGeom prst="ellipse">
+              <a:avLst/>
+            </a:prstGeom>
+          </p:spPr>
+          <p:style>
+            <a:lnRef idx="1">
+              <a:schemeClr val="accent2"/>
+            </a:lnRef>
+            <a:fillRef idx="3">
+              <a:schemeClr val="accent2"/>
+            </a:fillRef>
+            <a:effectRef idx="2">
+              <a:schemeClr val="accent2"/>
+            </a:effectRef>
+            <a:fontRef idx="minor">
+              <a:schemeClr val="lt1"/>
+            </a:fontRef>
+          </p:style>
+          <p:txBody>
+            <a:bodyPr rtlCol="0" anchor="ctr"/>
+            <a:lstStyle/>
+            <a:p>
+              <a:pPr algn="ctr"/>
+              <a:endParaRPr lang="en-US"/>
+            </a:p>
+          </p:txBody>
+        </p:sp>
+        <p:sp>
+          <p:nvSpPr>
+            <p:cNvPr id="105" name="Oval 104"/>
+            <p:cNvSpPr/>
+            <p:nvPr/>
+          </p:nvSpPr>
+          <p:spPr>
+            <a:xfrm>
+              <a:off x="5960578" y="2665389"/>
+              <a:ext cx="45719" cy="45719"/>
+            </a:xfrm>
+            <a:prstGeom prst="ellipse">
+              <a:avLst/>
+            </a:prstGeom>
+          </p:spPr>
+          <p:style>
+            <a:lnRef idx="1">
+              <a:schemeClr val="accent2"/>
+            </a:lnRef>
+            <a:fillRef idx="3">
+              <a:schemeClr val="accent2"/>
+            </a:fillRef>
+            <a:effectRef idx="2">
+              <a:schemeClr val="accent2"/>
+            </a:effectRef>
+            <a:fontRef idx="minor">
+              <a:schemeClr val="lt1"/>
+            </a:fontRef>
+          </p:style>
+          <p:txBody>
+            <a:bodyPr rtlCol="0" anchor="ctr"/>
+            <a:lstStyle/>
+            <a:p>
+              <a:pPr algn="ctr"/>
+              <a:endParaRPr lang="en-US"/>
+            </a:p>
+          </p:txBody>
+        </p:sp>
+        <p:sp>
+          <p:nvSpPr>
+            <p:cNvPr id="108" name="Oval 107"/>
+            <p:cNvSpPr/>
+            <p:nvPr/>
+          </p:nvSpPr>
+          <p:spPr>
+            <a:xfrm>
+              <a:off x="5573844" y="2306409"/>
+              <a:ext cx="45719" cy="45719"/>
+            </a:xfrm>
+            <a:prstGeom prst="ellipse">
+              <a:avLst/>
+            </a:prstGeom>
+          </p:spPr>
+          <p:style>
+            <a:lnRef idx="1">
+              <a:schemeClr val="accent2"/>
+            </a:lnRef>
+            <a:fillRef idx="3">
+              <a:schemeClr val="accent2"/>
+            </a:fillRef>
+            <a:effectRef idx="2">
+              <a:schemeClr val="accent2"/>
+            </a:effectRef>
+            <a:fontRef idx="minor">
+              <a:schemeClr val="lt1"/>
+            </a:fontRef>
+          </p:style>
+          <p:txBody>
+            <a:bodyPr rtlCol="0" anchor="ctr"/>
+            <a:lstStyle/>
+            <a:p>
+              <a:pPr algn="ctr"/>
+              <a:endParaRPr lang="en-US"/>
+            </a:p>
+          </p:txBody>
+        </p:sp>
+        <p:sp>
+          <p:nvSpPr>
+            <p:cNvPr id="109" name="Oval 108"/>
+            <p:cNvSpPr/>
+            <p:nvPr/>
+          </p:nvSpPr>
+          <p:spPr>
+            <a:xfrm>
+              <a:off x="5573844" y="2665389"/>
+              <a:ext cx="45719" cy="45719"/>
+            </a:xfrm>
+            <a:prstGeom prst="ellipse">
+              <a:avLst/>
+            </a:prstGeom>
+          </p:spPr>
+          <p:style>
+            <a:lnRef idx="1">
+              <a:schemeClr val="accent2"/>
+            </a:lnRef>
+            <a:fillRef idx="3">
+              <a:schemeClr val="accent2"/>
+            </a:fillRef>
+            <a:effectRef idx="2">
+              <a:schemeClr val="accent2"/>
+            </a:effectRef>
+            <a:fontRef idx="minor">
+              <a:schemeClr val="lt1"/>
+            </a:fontRef>
+          </p:style>
+          <p:txBody>
+            <a:bodyPr rtlCol="0" anchor="ctr"/>
+            <a:lstStyle/>
+            <a:p>
+              <a:pPr algn="ctr"/>
+              <a:endParaRPr lang="en-US"/>
+            </a:p>
+          </p:txBody>
+        </p:sp>
+        <p:sp>
+          <p:nvSpPr>
+            <p:cNvPr id="112" name="Oval 111"/>
+            <p:cNvSpPr/>
+            <p:nvPr/>
+          </p:nvSpPr>
+          <p:spPr>
+            <a:xfrm>
+              <a:off x="5187110" y="2440887"/>
+              <a:ext cx="45719" cy="45719"/>
+            </a:xfrm>
+            <a:prstGeom prst="ellipse">
+              <a:avLst/>
+            </a:prstGeom>
+          </p:spPr>
+          <p:style>
+            <a:lnRef idx="1">
+              <a:schemeClr val="accent2"/>
+            </a:lnRef>
+            <a:fillRef idx="3">
+              <a:schemeClr val="accent2"/>
+            </a:fillRef>
+            <a:effectRef idx="2">
+              <a:schemeClr val="accent2"/>
+            </a:effectRef>
+            <a:fontRef idx="minor">
+              <a:schemeClr val="lt1"/>
+            </a:fontRef>
+          </p:style>
+          <p:txBody>
+            <a:bodyPr rtlCol="0" anchor="ctr"/>
+            <a:lstStyle/>
+            <a:p>
+              <a:pPr algn="ctr"/>
+              <a:endParaRPr lang="en-US"/>
+            </a:p>
+          </p:txBody>
+        </p:sp>
+        <p:sp>
+          <p:nvSpPr>
+            <p:cNvPr id="113" name="Oval 112"/>
+            <p:cNvSpPr/>
+            <p:nvPr/>
+          </p:nvSpPr>
+          <p:spPr>
+            <a:xfrm>
+              <a:off x="5187110" y="2799867"/>
+              <a:ext cx="45719" cy="45719"/>
+            </a:xfrm>
+            <a:prstGeom prst="ellipse">
+              <a:avLst/>
+            </a:prstGeom>
+          </p:spPr>
+          <p:style>
+            <a:lnRef idx="1">
+              <a:schemeClr val="accent2"/>
+            </a:lnRef>
+            <a:fillRef idx="3">
+              <a:schemeClr val="accent2"/>
+            </a:fillRef>
+            <a:effectRef idx="2">
+              <a:schemeClr val="accent2"/>
+            </a:effectRef>
+            <a:fontRef idx="minor">
+              <a:schemeClr val="lt1"/>
+            </a:fontRef>
+          </p:style>
+          <p:txBody>
+            <a:bodyPr rtlCol="0" anchor="ctr"/>
+            <a:lstStyle/>
+            <a:p>
+              <a:pPr algn="ctr"/>
+              <a:endParaRPr lang="en-US"/>
+            </a:p>
+          </p:txBody>
+        </p:sp>
+        <p:sp>
+          <p:nvSpPr>
+            <p:cNvPr id="116" name="Oval 115"/>
+            <p:cNvSpPr/>
+            <p:nvPr/>
+          </p:nvSpPr>
+          <p:spPr>
+            <a:xfrm>
+              <a:off x="4800376" y="2642456"/>
+              <a:ext cx="45719" cy="45719"/>
+            </a:xfrm>
+            <a:prstGeom prst="ellipse">
+              <a:avLst/>
+            </a:prstGeom>
+          </p:spPr>
+          <p:style>
+            <a:lnRef idx="1">
+              <a:schemeClr val="accent2"/>
+            </a:lnRef>
+            <a:fillRef idx="3">
+              <a:schemeClr val="accent2"/>
+            </a:fillRef>
+            <a:effectRef idx="2">
+              <a:schemeClr val="accent2"/>
+            </a:effectRef>
+            <a:fontRef idx="minor">
+              <a:schemeClr val="lt1"/>
+            </a:fontRef>
+          </p:style>
+          <p:txBody>
+            <a:bodyPr rtlCol="0" anchor="ctr"/>
+            <a:lstStyle/>
+            <a:p>
+              <a:pPr algn="ctr"/>
+              <a:endParaRPr lang="en-US"/>
+            </a:p>
+          </p:txBody>
+        </p:sp>
+        <p:sp>
+          <p:nvSpPr>
+            <p:cNvPr id="117" name="Oval 116"/>
+            <p:cNvSpPr/>
+            <p:nvPr/>
+          </p:nvSpPr>
+          <p:spPr>
+            <a:xfrm>
+              <a:off x="4800376" y="3001436"/>
+              <a:ext cx="45719" cy="45719"/>
+            </a:xfrm>
+            <a:prstGeom prst="ellipse">
+              <a:avLst/>
+            </a:prstGeom>
+          </p:spPr>
+          <p:style>
+            <a:lnRef idx="1">
+              <a:schemeClr val="accent2"/>
+            </a:lnRef>
+            <a:fillRef idx="3">
+              <a:schemeClr val="accent2"/>
+            </a:fillRef>
+            <a:effectRef idx="2">
+              <a:schemeClr val="accent2"/>
+            </a:effectRef>
+            <a:fontRef idx="minor">
+              <a:schemeClr val="lt1"/>
+            </a:fontRef>
+          </p:style>
+          <p:txBody>
+            <a:bodyPr rtlCol="0" anchor="ctr"/>
+            <a:lstStyle/>
+            <a:p>
+              <a:pPr algn="ctr"/>
+              <a:endParaRPr lang="en-US"/>
+            </a:p>
+          </p:txBody>
+        </p:sp>
+        <p:sp>
+          <p:nvSpPr>
+            <p:cNvPr id="120" name="Oval 119"/>
+            <p:cNvSpPr/>
+            <p:nvPr/>
+          </p:nvSpPr>
+          <p:spPr>
+            <a:xfrm>
+              <a:off x="4413642" y="2844173"/>
+              <a:ext cx="45719" cy="45719"/>
+            </a:xfrm>
+            <a:prstGeom prst="ellipse">
+              <a:avLst/>
+            </a:prstGeom>
+          </p:spPr>
+          <p:style>
+            <a:lnRef idx="1">
+              <a:schemeClr val="accent2"/>
+            </a:lnRef>
+            <a:fillRef idx="3">
+              <a:schemeClr val="accent2"/>
+            </a:fillRef>
+            <a:effectRef idx="2">
+              <a:schemeClr val="accent2"/>
+            </a:effectRef>
+            <a:fontRef idx="minor">
+              <a:schemeClr val="lt1"/>
+            </a:fontRef>
+          </p:style>
+          <p:txBody>
+            <a:bodyPr rtlCol="0" anchor="ctr"/>
+            <a:lstStyle/>
+            <a:p>
+              <a:pPr algn="ctr"/>
+              <a:endParaRPr lang="en-US"/>
+            </a:p>
+          </p:txBody>
+        </p:sp>
+        <p:sp>
+          <p:nvSpPr>
+            <p:cNvPr id="121" name="Oval 120"/>
+            <p:cNvSpPr/>
+            <p:nvPr/>
+          </p:nvSpPr>
+          <p:spPr>
+            <a:xfrm>
+              <a:off x="4413642" y="3203153"/>
+              <a:ext cx="45719" cy="45719"/>
+            </a:xfrm>
+            <a:prstGeom prst="ellipse">
+              <a:avLst/>
+            </a:prstGeom>
+          </p:spPr>
+          <p:style>
+            <a:lnRef idx="1">
+              <a:schemeClr val="accent2"/>
+            </a:lnRef>
+            <a:fillRef idx="3">
+              <a:schemeClr val="accent2"/>
+            </a:fillRef>
+            <a:effectRef idx="2">
+              <a:schemeClr val="accent2"/>
+            </a:effectRef>
+            <a:fontRef idx="minor">
+              <a:schemeClr val="lt1"/>
+            </a:fontRef>
+          </p:style>
+          <p:txBody>
+            <a:bodyPr rtlCol="0" anchor="ctr"/>
+            <a:lstStyle/>
+            <a:p>
+              <a:pPr algn="ctr"/>
+              <a:endParaRPr lang="en-US"/>
+            </a:p>
+          </p:txBody>
+        </p:sp>
+        <p:sp>
+          <p:nvSpPr>
+            <p:cNvPr id="124" name="Oval 123"/>
+            <p:cNvSpPr/>
+            <p:nvPr/>
+          </p:nvSpPr>
+          <p:spPr>
+            <a:xfrm>
+              <a:off x="4026908" y="3045890"/>
+              <a:ext cx="45719" cy="45719"/>
+            </a:xfrm>
+            <a:prstGeom prst="ellipse">
+              <a:avLst/>
+            </a:prstGeom>
+          </p:spPr>
+          <p:style>
+            <a:lnRef idx="1">
+              <a:schemeClr val="accent2"/>
+            </a:lnRef>
+            <a:fillRef idx="3">
+              <a:schemeClr val="accent2"/>
+            </a:fillRef>
+            <a:effectRef idx="2">
+              <a:schemeClr val="accent2"/>
+            </a:effectRef>
+            <a:fontRef idx="minor">
+              <a:schemeClr val="lt1"/>
+            </a:fontRef>
+          </p:style>
+          <p:txBody>
+            <a:bodyPr rtlCol="0" anchor="ctr"/>
+            <a:lstStyle/>
+            <a:p>
+              <a:pPr algn="ctr"/>
+              <a:endParaRPr lang="en-US"/>
+            </a:p>
+          </p:txBody>
+        </p:sp>
+        <p:sp>
+          <p:nvSpPr>
+            <p:cNvPr id="125" name="Oval 124"/>
+            <p:cNvSpPr/>
+            <p:nvPr/>
+          </p:nvSpPr>
+          <p:spPr>
+            <a:xfrm>
+              <a:off x="4026908" y="3404870"/>
+              <a:ext cx="45719" cy="45719"/>
+            </a:xfrm>
+            <a:prstGeom prst="ellipse">
+              <a:avLst/>
+            </a:prstGeom>
+          </p:spPr>
+          <p:style>
+            <a:lnRef idx="1">
+              <a:schemeClr val="accent2"/>
+            </a:lnRef>
+            <a:fillRef idx="3">
+              <a:schemeClr val="accent2"/>
+            </a:fillRef>
+            <a:effectRef idx="2">
+              <a:schemeClr val="accent2"/>
+            </a:effectRef>
+            <a:fontRef idx="minor">
+              <a:schemeClr val="lt1"/>
+            </a:fontRef>
+          </p:style>
+          <p:txBody>
+            <a:bodyPr rtlCol="0" anchor="ctr"/>
+            <a:lstStyle/>
+            <a:p>
+              <a:pPr algn="ctr"/>
+              <a:endParaRPr lang="en-US"/>
+            </a:p>
+          </p:txBody>
+        </p:sp>
+        <p:sp>
+          <p:nvSpPr>
+            <p:cNvPr id="128" name="Oval 127"/>
+            <p:cNvSpPr/>
+            <p:nvPr/>
+          </p:nvSpPr>
+          <p:spPr>
+            <a:xfrm>
+              <a:off x="3640174" y="3240136"/>
+              <a:ext cx="45719" cy="45719"/>
+            </a:xfrm>
+            <a:prstGeom prst="ellipse">
+              <a:avLst/>
+            </a:prstGeom>
+          </p:spPr>
+          <p:style>
+            <a:lnRef idx="1">
+              <a:schemeClr val="accent2"/>
+            </a:lnRef>
+            <a:fillRef idx="3">
+              <a:schemeClr val="accent2"/>
+            </a:fillRef>
+            <a:effectRef idx="2">
+              <a:schemeClr val="accent2"/>
+            </a:effectRef>
+            <a:fontRef idx="minor">
+              <a:schemeClr val="lt1"/>
+            </a:fontRef>
+          </p:style>
+          <p:txBody>
+            <a:bodyPr rtlCol="0" anchor="ctr"/>
+            <a:lstStyle/>
+            <a:p>
+              <a:pPr algn="ctr"/>
+              <a:endParaRPr lang="en-US"/>
+            </a:p>
+          </p:txBody>
+        </p:sp>
+        <p:sp>
+          <p:nvSpPr>
+            <p:cNvPr id="129" name="Oval 128"/>
+            <p:cNvSpPr/>
+            <p:nvPr/>
+          </p:nvSpPr>
+          <p:spPr>
+            <a:xfrm>
+              <a:off x="3640174" y="3599116"/>
+              <a:ext cx="45719" cy="45719"/>
+            </a:xfrm>
+            <a:prstGeom prst="ellipse">
+              <a:avLst/>
+            </a:prstGeom>
+          </p:spPr>
+          <p:style>
+            <a:lnRef idx="1">
+              <a:schemeClr val="accent2"/>
+            </a:lnRef>
+            <a:fillRef idx="3">
+              <a:schemeClr val="accent2"/>
+            </a:fillRef>
+            <a:effectRef idx="2">
+              <a:schemeClr val="accent2"/>
+            </a:effectRef>
+            <a:fontRef idx="minor">
+              <a:schemeClr val="lt1"/>
+            </a:fontRef>
+          </p:style>
+          <p:txBody>
+            <a:bodyPr rtlCol="0" anchor="ctr"/>
+            <a:lstStyle/>
+            <a:p>
+              <a:pPr algn="ctr"/>
+              <a:endParaRPr lang="en-US"/>
+            </a:p>
+          </p:txBody>
+        </p:sp>
+        <p:sp>
+          <p:nvSpPr>
+            <p:cNvPr id="132" name="Oval 131"/>
+            <p:cNvSpPr/>
+            <p:nvPr/>
+          </p:nvSpPr>
+          <p:spPr>
+            <a:xfrm>
+              <a:off x="3253440" y="3441853"/>
+              <a:ext cx="45719" cy="45719"/>
+            </a:xfrm>
+            <a:prstGeom prst="ellipse">
+              <a:avLst/>
+            </a:prstGeom>
+          </p:spPr>
+          <p:style>
+            <a:lnRef idx="1">
+              <a:schemeClr val="accent2"/>
+            </a:lnRef>
+            <a:fillRef idx="3">
+              <a:schemeClr val="accent2"/>
+            </a:fillRef>
+            <a:effectRef idx="2">
+              <a:schemeClr val="accent2"/>
+            </a:effectRef>
+            <a:fontRef idx="minor">
+              <a:schemeClr val="lt1"/>
+            </a:fontRef>
+          </p:style>
+          <p:txBody>
+            <a:bodyPr rtlCol="0" anchor="ctr"/>
+            <a:lstStyle/>
+            <a:p>
+              <a:pPr algn="ctr"/>
+              <a:endParaRPr lang="en-US"/>
+            </a:p>
+          </p:txBody>
+        </p:sp>
+      </p:grpSp>
+      <p:sp>
+        <p:nvSpPr>
+          <p:cNvPr id="65" name="Freeform 64"/>
+          <p:cNvSpPr/>
+          <p:nvPr/>
+        </p:nvSpPr>
+        <p:spPr>
+          <a:xfrm rot="10800000">
+            <a:off x="-113292" y="3309760"/>
+            <a:ext cx="5056777" cy="2863327"/>
+          </a:xfrm>
+          <a:custGeom>
+            <a:avLst/>
+            <a:gdLst>
+              <a:gd name="connsiteX0" fmla="*/ 5902960 w 5913120"/>
+              <a:gd name="connsiteY0" fmla="*/ 0 h 2783840"/>
+              <a:gd name="connsiteX1" fmla="*/ 2651760 w 5913120"/>
+              <a:gd name="connsiteY1" fmla="*/ 10160 h 2783840"/>
+              <a:gd name="connsiteX2" fmla="*/ 0 w 5913120"/>
+              <a:gd name="connsiteY2" fmla="*/ 1381760 h 2783840"/>
+              <a:gd name="connsiteX3" fmla="*/ 2286000 w 5913120"/>
+              <a:gd name="connsiteY3" fmla="*/ 2783840 h 2783840"/>
+              <a:gd name="connsiteX4" fmla="*/ 2682240 w 5913120"/>
+              <a:gd name="connsiteY4" fmla="*/ 2600960 h 2783840"/>
+              <a:gd name="connsiteX5" fmla="*/ 5913120 w 5913120"/>
+              <a:gd name="connsiteY5" fmla="*/ 2600960 h 2783840"/>
+              <a:gd name="connsiteX6" fmla="*/ 5902960 w 5913120"/>
+              <a:gd name="connsiteY6" fmla="*/ 0 h 2783840"/>
+              <a:gd name="connsiteX0" fmla="*/ 4826484 w 5913120"/>
+              <a:gd name="connsiteY0" fmla="*/ 0 h 2783840"/>
+              <a:gd name="connsiteX1" fmla="*/ 2651760 w 5913120"/>
+              <a:gd name="connsiteY1" fmla="*/ 10160 h 2783840"/>
+              <a:gd name="connsiteX2" fmla="*/ 0 w 5913120"/>
+              <a:gd name="connsiteY2" fmla="*/ 1381760 h 2783840"/>
+              <a:gd name="connsiteX3" fmla="*/ 2286000 w 5913120"/>
+              <a:gd name="connsiteY3" fmla="*/ 2783840 h 2783840"/>
+              <a:gd name="connsiteX4" fmla="*/ 2682240 w 5913120"/>
+              <a:gd name="connsiteY4" fmla="*/ 2600960 h 2783840"/>
+              <a:gd name="connsiteX5" fmla="*/ 5913120 w 5913120"/>
+              <a:gd name="connsiteY5" fmla="*/ 2600960 h 2783840"/>
+              <a:gd name="connsiteX6" fmla="*/ 4826484 w 5913120"/>
+              <a:gd name="connsiteY6" fmla="*/ 0 h 2783840"/>
+              <a:gd name="connsiteX0" fmla="*/ 4826484 w 4836644"/>
+              <a:gd name="connsiteY0" fmla="*/ 0 h 2783840"/>
+              <a:gd name="connsiteX1" fmla="*/ 2651760 w 4836644"/>
+              <a:gd name="connsiteY1" fmla="*/ 10160 h 2783840"/>
+              <a:gd name="connsiteX2" fmla="*/ 0 w 4836644"/>
+              <a:gd name="connsiteY2" fmla="*/ 1381760 h 2783840"/>
+              <a:gd name="connsiteX3" fmla="*/ 2286000 w 4836644"/>
+              <a:gd name="connsiteY3" fmla="*/ 2783840 h 2783840"/>
+              <a:gd name="connsiteX4" fmla="*/ 2682240 w 4836644"/>
+              <a:gd name="connsiteY4" fmla="*/ 2600960 h 2783840"/>
+              <a:gd name="connsiteX5" fmla="*/ 4836644 w 4836644"/>
+              <a:gd name="connsiteY5" fmla="*/ 2600960 h 2783840"/>
+              <a:gd name="connsiteX6" fmla="*/ 4826484 w 4836644"/>
+              <a:gd name="connsiteY6" fmla="*/ 0 h 2783840"/>
+              <a:gd name="connsiteX0" fmla="*/ 4826484 w 5056777"/>
+              <a:gd name="connsiteY0" fmla="*/ 0 h 2783840"/>
+              <a:gd name="connsiteX1" fmla="*/ 2651760 w 5056777"/>
+              <a:gd name="connsiteY1" fmla="*/ 10160 h 2783840"/>
+              <a:gd name="connsiteX2" fmla="*/ 0 w 5056777"/>
+              <a:gd name="connsiteY2" fmla="*/ 1381760 h 2783840"/>
+              <a:gd name="connsiteX3" fmla="*/ 2286000 w 5056777"/>
+              <a:gd name="connsiteY3" fmla="*/ 2783840 h 2783840"/>
+              <a:gd name="connsiteX4" fmla="*/ 2682240 w 5056777"/>
+              <a:gd name="connsiteY4" fmla="*/ 2600960 h 2783840"/>
+              <a:gd name="connsiteX5" fmla="*/ 5056777 w 5056777"/>
+              <a:gd name="connsiteY5" fmla="*/ 2600960 h 2783840"/>
+              <a:gd name="connsiteX6" fmla="*/ 4826484 w 5056777"/>
+              <a:gd name="connsiteY6" fmla="*/ 0 h 2783840"/>
+              <a:gd name="connsiteX0" fmla="*/ 5046617 w 5056777"/>
+              <a:gd name="connsiteY0" fmla="*/ 0 h 2800773"/>
+              <a:gd name="connsiteX1" fmla="*/ 2651760 w 5056777"/>
+              <a:gd name="connsiteY1" fmla="*/ 27093 h 2800773"/>
+              <a:gd name="connsiteX2" fmla="*/ 0 w 5056777"/>
+              <a:gd name="connsiteY2" fmla="*/ 1398693 h 2800773"/>
+              <a:gd name="connsiteX3" fmla="*/ 2286000 w 5056777"/>
+              <a:gd name="connsiteY3" fmla="*/ 2800773 h 2800773"/>
+              <a:gd name="connsiteX4" fmla="*/ 2682240 w 5056777"/>
+              <a:gd name="connsiteY4" fmla="*/ 2617893 h 2800773"/>
+              <a:gd name="connsiteX5" fmla="*/ 5056777 w 5056777"/>
+              <a:gd name="connsiteY5" fmla="*/ 2617893 h 2800773"/>
+              <a:gd name="connsiteX6" fmla="*/ 5046617 w 5056777"/>
+              <a:gd name="connsiteY6" fmla="*/ 0 h 2800773"/>
+              <a:gd name="connsiteX0" fmla="*/ 5046617 w 5056777"/>
+              <a:gd name="connsiteY0" fmla="*/ 0 h 2800773"/>
+              <a:gd name="connsiteX1" fmla="*/ 2651760 w 5056777"/>
+              <a:gd name="connsiteY1" fmla="*/ 27093 h 2800773"/>
+              <a:gd name="connsiteX2" fmla="*/ 0 w 5056777"/>
+              <a:gd name="connsiteY2" fmla="*/ 1398693 h 2800773"/>
+              <a:gd name="connsiteX3" fmla="*/ 2286000 w 5056777"/>
+              <a:gd name="connsiteY3" fmla="*/ 2800773 h 2800773"/>
+              <a:gd name="connsiteX4" fmla="*/ 2682240 w 5056777"/>
+              <a:gd name="connsiteY4" fmla="*/ 2617893 h 2800773"/>
+              <a:gd name="connsiteX5" fmla="*/ 5056777 w 5056777"/>
+              <a:gd name="connsiteY5" fmla="*/ 2617893 h 2800773"/>
+              <a:gd name="connsiteX6" fmla="*/ 5046617 w 5056777"/>
+              <a:gd name="connsiteY6" fmla="*/ 0 h 2800773"/>
+              <a:gd name="connsiteX0" fmla="*/ 5046617 w 5056777"/>
+              <a:gd name="connsiteY0" fmla="*/ 2790 h 2773680"/>
+              <a:gd name="connsiteX1" fmla="*/ 2651760 w 5056777"/>
+              <a:gd name="connsiteY1" fmla="*/ 0 h 2773680"/>
+              <a:gd name="connsiteX2" fmla="*/ 0 w 5056777"/>
+              <a:gd name="connsiteY2" fmla="*/ 1371600 h 2773680"/>
+              <a:gd name="connsiteX3" fmla="*/ 2286000 w 5056777"/>
+              <a:gd name="connsiteY3" fmla="*/ 2773680 h 2773680"/>
+              <a:gd name="connsiteX4" fmla="*/ 2682240 w 5056777"/>
+              <a:gd name="connsiteY4" fmla="*/ 2590800 h 2773680"/>
+              <a:gd name="connsiteX5" fmla="*/ 5056777 w 5056777"/>
+              <a:gd name="connsiteY5" fmla="*/ 2590800 h 2773680"/>
+              <a:gd name="connsiteX6" fmla="*/ 5046617 w 5056777"/>
+              <a:gd name="connsiteY6" fmla="*/ 2790 h 2773680"/>
+              <a:gd name="connsiteX0" fmla="*/ 5046617 w 5056777"/>
+              <a:gd name="connsiteY0" fmla="*/ 2790 h 2773680"/>
+              <a:gd name="connsiteX1" fmla="*/ 2651760 w 5056777"/>
+              <a:gd name="connsiteY1" fmla="*/ 0 h 2773680"/>
+              <a:gd name="connsiteX2" fmla="*/ 0 w 5056777"/>
+              <a:gd name="connsiteY2" fmla="*/ 1371600 h 2773680"/>
+              <a:gd name="connsiteX3" fmla="*/ 2286000 w 5056777"/>
+              <a:gd name="connsiteY3" fmla="*/ 2773680 h 2773680"/>
+              <a:gd name="connsiteX4" fmla="*/ 2652358 w 5056777"/>
+              <a:gd name="connsiteY4" fmla="*/ 2590800 h 2773680"/>
+              <a:gd name="connsiteX5" fmla="*/ 5056777 w 5056777"/>
+              <a:gd name="connsiteY5" fmla="*/ 2590800 h 2773680"/>
+              <a:gd name="connsiteX6" fmla="*/ 5046617 w 5056777"/>
+              <a:gd name="connsiteY6" fmla="*/ 2790 h 2773680"/>
+              <a:gd name="connsiteX0" fmla="*/ 5046617 w 5056777"/>
+              <a:gd name="connsiteY0" fmla="*/ 2790 h 2863327"/>
+              <a:gd name="connsiteX1" fmla="*/ 2651760 w 5056777"/>
+              <a:gd name="connsiteY1" fmla="*/ 0 h 2863327"/>
+              <a:gd name="connsiteX2" fmla="*/ 0 w 5056777"/>
+              <a:gd name="connsiteY2" fmla="*/ 1371600 h 2863327"/>
+              <a:gd name="connsiteX3" fmla="*/ 2121647 w 5056777"/>
+              <a:gd name="connsiteY3" fmla="*/ 2863327 h 2863327"/>
+              <a:gd name="connsiteX4" fmla="*/ 2652358 w 5056777"/>
+              <a:gd name="connsiteY4" fmla="*/ 2590800 h 2863327"/>
+              <a:gd name="connsiteX5" fmla="*/ 5056777 w 5056777"/>
+              <a:gd name="connsiteY5" fmla="*/ 2590800 h 2863327"/>
+              <a:gd name="connsiteX6" fmla="*/ 5046617 w 5056777"/>
+              <a:gd name="connsiteY6" fmla="*/ 2790 h 2863327"/>
+            </a:gdLst>
+            <a:ahLst/>
+            <a:cxnLst>
+              <a:cxn ang="0">
+                <a:pos x="connsiteX0" y="connsiteY0"/>
+              </a:cxn>
+              <a:cxn ang="0">
+                <a:pos x="connsiteX1" y="connsiteY1"/>
+              </a:cxn>
+              <a:cxn ang="0">
+                <a:pos x="connsiteX2" y="connsiteY2"/>
+              </a:cxn>
+              <a:cxn ang="0">
+                <a:pos x="connsiteX3" y="connsiteY3"/>
+              </a:cxn>
+              <a:cxn ang="0">
+                <a:pos x="connsiteX4" y="connsiteY4"/>
+              </a:cxn>
+              <a:cxn ang="0">
+                <a:pos x="connsiteX5" y="connsiteY5"/>
+              </a:cxn>
+              <a:cxn ang="0">
+                <a:pos x="connsiteX6" y="connsiteY6"/>
+              </a:cxn>
+            </a:cxnLst>
+            <a:rect l="l" t="t" r="r" b="b"/>
+            <a:pathLst>
+              <a:path w="5056777" h="2863327">
+                <a:moveTo>
+                  <a:pt x="5046617" y="2790"/>
+                </a:moveTo>
+                <a:lnTo>
+                  <a:pt x="2651760" y="0"/>
+                </a:lnTo>
+                <a:lnTo>
+                  <a:pt x="0" y="1371600"/>
+                </a:lnTo>
+                <a:lnTo>
+                  <a:pt x="2121647" y="2863327"/>
+                </a:lnTo>
+                <a:lnTo>
+                  <a:pt x="2652358" y="2590800"/>
+                </a:lnTo>
+                <a:lnTo>
+                  <a:pt x="5056777" y="2590800"/>
+                </a:lnTo>
+                <a:cubicBezTo>
+                  <a:pt x="5053390" y="1720427"/>
+                  <a:pt x="5050004" y="863003"/>
+                  <a:pt x="5046617" y="2790"/>
+                </a:cubicBezTo>
+                <a:close/>
+              </a:path>
+            </a:pathLst>
+          </a:custGeom>
+          <a:gradFill>
+            <a:gsLst>
+              <a:gs pos="93000">
+                <a:schemeClr val="tx2">
+                  <a:lumMod val="60000"/>
+                  <a:lumOff val="40000"/>
+                </a:schemeClr>
+              </a:gs>
+              <a:gs pos="73000">
+                <a:schemeClr val="accent1">
+                  <a:lumMod val="60000"/>
+                  <a:lumOff val="40000"/>
+                </a:schemeClr>
+              </a:gs>
+              <a:gs pos="0">
+                <a:schemeClr val="accent1">
+                  <a:lumMod val="20000"/>
+                  <a:lumOff val="80000"/>
+                </a:schemeClr>
+              </a:gs>
+            </a:gsLst>
+          </a:gradFill>
+          <a:ln>
+            <a:solidFill>
+              <a:schemeClr val="accent1"/>
+            </a:solidFill>
+          </a:ln>
+        </p:spPr>
+        <p:style>
+          <a:lnRef idx="1">
+            <a:schemeClr val="accent6"/>
+          </a:lnRef>
+          <a:fillRef idx="2">
+            <a:schemeClr val="accent6"/>
+          </a:fillRef>
+          <a:effectRef idx="1">
+            <a:schemeClr val="accent6"/>
+          </a:effectRef>
+          <a:fontRef idx="minor">
+            <a:schemeClr val="dk1"/>
+          </a:fontRef>
+        </p:style>
+        <p:txBody>
+          <a:bodyPr rtlCol="0" anchor="ctr"/>
+          <a:lstStyle/>
+          <a:p>
+            <a:pPr algn="ctr"/>
+            <a:endParaRPr lang="en-US" dirty="0"/>
+          </a:p>
+        </p:txBody>
+      </p:sp>
+      <p:sp>
+        <p:nvSpPr>
+          <p:cNvPr id="133" name="Oval 132"/>
+          <p:cNvSpPr/>
+          <p:nvPr/>
+        </p:nvSpPr>
+        <p:spPr>
+          <a:xfrm>
+            <a:off x="3253440" y="3800833"/>
+            <a:ext cx="45719" cy="45719"/>
+          </a:xfrm>
+          <a:prstGeom prst="ellipse">
+            <a:avLst/>
+          </a:prstGeom>
+        </p:spPr>
+        <p:style>
+          <a:lnRef idx="2">
+            <a:schemeClr val="dk1">
+              <a:shade val="50000"/>
+            </a:schemeClr>
+          </a:lnRef>
+          <a:fillRef idx="1">
+            <a:schemeClr val="dk1"/>
+          </a:fillRef>
+          <a:effectRef idx="0">
+            <a:schemeClr val="dk1"/>
+          </a:effectRef>
+          <a:fontRef idx="minor">
+            <a:schemeClr val="lt1"/>
+          </a:fontRef>
+        </p:style>
+        <p:txBody>
+          <a:bodyPr rtlCol="0" anchor="ctr"/>
+          <a:lstStyle/>
+          <a:p>
+            <a:pPr algn="ctr"/>
+            <a:endParaRPr lang="en-US"/>
+          </a:p>
+        </p:txBody>
+      </p:sp>
       <p:cxnSp>
         <p:nvCxnSpPr>
           <p:cNvPr id="23" name="Straight Connector 22"/>
@@ -3212,7 +4575,7 @@
         </p:nvCxnSpPr>
         <p:spPr>
           <a:xfrm flipH="1">
-            <a:off x="3323087" y="4200071"/>
+            <a:off x="3983474" y="3624349"/>
             <a:ext cx="196628" cy="351264"/>
           </a:xfrm>
           <a:prstGeom prst="line">
@@ -3243,7 +4606,7 @@
         </p:nvGrpSpPr>
         <p:grpSpPr>
           <a:xfrm>
-            <a:off x="1729806" y="1167037"/>
+            <a:off x="2390193" y="591315"/>
             <a:ext cx="3129487" cy="420387"/>
             <a:chOff x="1729806" y="1167037"/>
             <a:chExt cx="3129487" cy="420387"/>
@@ -3486,7 +4849,7 @@
         </p:nvGrpSpPr>
         <p:grpSpPr>
           <a:xfrm>
-            <a:off x="1623945" y="1883726"/>
+            <a:off x="2284332" y="1308004"/>
             <a:ext cx="3259656" cy="1541116"/>
             <a:chOff x="1623945" y="1883726"/>
             <a:chExt cx="3259656" cy="1541116"/>
@@ -3981,7 +5344,7 @@
         </p:nvSpPr>
         <p:spPr>
           <a:xfrm>
-            <a:off x="1607886" y="1391527"/>
+            <a:off x="2268273" y="815805"/>
             <a:ext cx="3269816" cy="391789"/>
           </a:xfrm>
           <a:prstGeom prst="rect">
@@ -4023,7 +5386,7 @@
         </p:nvSpPr>
         <p:spPr>
           <a:xfrm rot="1880276">
-            <a:off x="1906821" y="4531349"/>
+            <a:off x="2567208" y="3955627"/>
             <a:ext cx="2690033" cy="273990"/>
           </a:xfrm>
           <a:prstGeom prst="rect">
@@ -4082,7 +5445,7 @@
         </p:nvCxnSpPr>
         <p:spPr>
           <a:xfrm flipH="1">
-            <a:off x="2445795" y="5630137"/>
+            <a:off x="3106182" y="5054415"/>
             <a:ext cx="2431907" cy="0"/>
           </a:xfrm>
           <a:prstGeom prst="line">
@@ -4113,7 +5476,7 @@
         </p:nvSpPr>
         <p:spPr>
           <a:xfrm>
-            <a:off x="3379019" y="5168472"/>
+            <a:off x="4039406" y="4592750"/>
             <a:ext cx="811981" cy="461665"/>
           </a:xfrm>
           <a:prstGeom prst="rect">
@@ -4149,7 +5512,7 @@
         </p:nvSpPr>
         <p:spPr>
           <a:xfrm>
-            <a:off x="3005184" y="2012602"/>
+            <a:off x="3665571" y="1436880"/>
             <a:ext cx="811981" cy="461665"/>
           </a:xfrm>
           <a:prstGeom prst="rect">
@@ -4192,7 +5555,7 @@
         </p:nvCxnSpPr>
         <p:spPr>
           <a:xfrm>
-            <a:off x="1623945" y="2095500"/>
+            <a:off x="2284332" y="1519778"/>
             <a:ext cx="3251528" cy="0"/>
           </a:xfrm>
           <a:prstGeom prst="straightConnector1">
@@ -4230,7 +5593,7 @@
         </p:nvCxnSpPr>
         <p:spPr>
           <a:xfrm>
-            <a:off x="2295407" y="3659481"/>
+            <a:off x="2955794" y="3083759"/>
             <a:ext cx="2291858" cy="1430679"/>
           </a:xfrm>
           <a:prstGeom prst="straightConnector1">
@@ -4268,7 +5631,7 @@
         </p:nvSpPr>
         <p:spPr>
           <a:xfrm>
-            <a:off x="3574544" y="4124745"/>
+            <a:off x="4234931" y="3549023"/>
             <a:ext cx="811981" cy="461665"/>
           </a:xfrm>
           <a:prstGeom prst="rect">
@@ -4311,7 +5674,7 @@
         </p:nvCxnSpPr>
         <p:spPr>
           <a:xfrm>
-            <a:off x="1316539" y="1783316"/>
+            <a:off x="1976926" y="1207594"/>
             <a:ext cx="0" cy="2822728"/>
           </a:xfrm>
           <a:prstGeom prst="straightConnector1">
@@ -4349,7 +5712,7 @@
         </p:nvSpPr>
         <p:spPr>
           <a:xfrm>
-            <a:off x="3188091" y="4606044"/>
+            <a:off x="3848478" y="4030322"/>
             <a:ext cx="140128" cy="140128"/>
           </a:xfrm>
           <a:prstGeom prst="ellipse">
@@ -4389,7 +5752,7 @@
         </p:nvCxnSpPr>
         <p:spPr>
           <a:xfrm flipH="1" flipV="1">
-            <a:off x="3307698" y="4725651"/>
+            <a:off x="3968085" y="4149929"/>
             <a:ext cx="1570004" cy="904486"/>
           </a:xfrm>
           <a:prstGeom prst="line">
@@ -4420,7 +5783,7 @@
         </p:nvCxnSpPr>
         <p:spPr>
           <a:xfrm flipH="1">
-            <a:off x="4471885" y="4915596"/>
+            <a:off x="5132272" y="4339874"/>
             <a:ext cx="205671" cy="345756"/>
           </a:xfrm>
           <a:prstGeom prst="line">
@@ -4451,7 +5814,7 @@
         </p:nvCxnSpPr>
         <p:spPr>
           <a:xfrm>
-            <a:off x="1607886" y="1783316"/>
+            <a:off x="2268273" y="1207594"/>
             <a:ext cx="0" cy="921784"/>
           </a:xfrm>
           <a:prstGeom prst="line">
@@ -4482,7 +5845,7 @@
         </p:nvCxnSpPr>
         <p:spPr>
           <a:xfrm>
-            <a:off x="4877702" y="1783316"/>
+            <a:off x="5538089" y="1207594"/>
             <a:ext cx="0" cy="921784"/>
           </a:xfrm>
           <a:prstGeom prst="line">
@@ -4515,7 +5878,7 @@
         </p:nvCxnSpPr>
         <p:spPr>
           <a:xfrm flipH="1">
-            <a:off x="1083733" y="4676108"/>
+            <a:off x="1744120" y="4100386"/>
             <a:ext cx="2104358" cy="0"/>
           </a:xfrm>
           <a:prstGeom prst="line">
@@ -4546,7 +5909,7 @@
         </p:nvSpPr>
         <p:spPr>
           <a:xfrm>
-            <a:off x="917825" y="2886362"/>
+            <a:off x="1578212" y="2310640"/>
             <a:ext cx="811981" cy="461665"/>
           </a:xfrm>
           <a:prstGeom prst="rect">
@@ -4589,7 +5952,7 @@
         </p:nvSpPr>
         <p:spPr>
           <a:xfrm>
-            <a:off x="2106950" y="2784762"/>
+            <a:off x="2767337" y="2209040"/>
             <a:ext cx="811981" cy="461665"/>
           </a:xfrm>
           <a:prstGeom prst="rect">
@@ -4632,7 +5995,7 @@
         </p:nvSpPr>
         <p:spPr>
           <a:xfrm>
-            <a:off x="5090160" y="1558606"/>
+            <a:off x="5750547" y="982884"/>
             <a:ext cx="1188720" cy="650240"/>
           </a:xfrm>
           <a:prstGeom prst="rightArrow">
@@ -4690,7 +6053,7 @@
         </p:nvCxnSpPr>
         <p:spPr>
           <a:xfrm>
-            <a:off x="6792779" y="2474267"/>
+            <a:off x="7453166" y="1898545"/>
             <a:ext cx="0" cy="2579989"/>
           </a:xfrm>
           <a:prstGeom prst="straightConnector1">
@@ -4728,7 +6091,7 @@
         </p:nvSpPr>
         <p:spPr>
           <a:xfrm>
-            <a:off x="6792779" y="3435924"/>
+            <a:off x="7453166" y="2860202"/>
             <a:ext cx="811981" cy="461665"/>
           </a:xfrm>
           <a:prstGeom prst="rect">
@@ -4771,7 +6134,7 @@
         </p:nvSpPr>
         <p:spPr>
           <a:xfrm>
-            <a:off x="2512940" y="3265152"/>
+            <a:off x="3173327" y="2689430"/>
             <a:ext cx="811981" cy="461665"/>
           </a:xfrm>
           <a:prstGeom prst="rect">
@@ -4814,7 +6177,7 @@
         </p:nvSpPr>
         <p:spPr>
           <a:xfrm>
-            <a:off x="2445795" y="3421721"/>
+            <a:off x="3106182" y="2845999"/>
             <a:ext cx="582332" cy="305016"/>
           </a:xfrm>
           <a:custGeom>
@@ -4893,7 +6256,7 @@
         </p:nvSpPr>
         <p:spPr>
           <a:xfrm>
-            <a:off x="4903197" y="5069341"/>
+            <a:off x="5563584" y="4493619"/>
             <a:ext cx="811981" cy="461665"/>
           </a:xfrm>
           <a:prstGeom prst="rect">
@@ -4936,7 +6299,7 @@
         </p:nvSpPr>
         <p:spPr>
           <a:xfrm>
-            <a:off x="4520120" y="4948233"/>
+            <a:off x="5180507" y="4372511"/>
             <a:ext cx="582332" cy="305016"/>
           </a:xfrm>
           <a:custGeom>
@@ -5017,8 +6380,8 @@
         </p:nvCxnSpPr>
         <p:spPr>
           <a:xfrm flipH="1">
-            <a:off x="4876800" y="4797065"/>
-            <a:ext cx="519477" cy="272775"/>
+            <a:off x="5492364" y="4191000"/>
+            <a:ext cx="603636" cy="303118"/>
           </a:xfrm>
           <a:prstGeom prst="line">
             <a:avLst/>
@@ -5096,8 +6459,8 @@
         </p:nvCxnSpPr>
         <p:spPr>
           <a:xfrm>
-            <a:off x="833120" y="1783316"/>
-            <a:ext cx="0" cy="4707795"/>
+            <a:off x="1493507" y="1207594"/>
+            <a:ext cx="0" cy="5283517"/>
           </a:xfrm>
           <a:prstGeom prst="straightConnector1">
             <a:avLst/>
@@ -5134,7 +6497,7 @@
         </p:nvSpPr>
         <p:spPr>
           <a:xfrm>
-            <a:off x="795905" y="4972862"/>
+            <a:off x="1456292" y="4549540"/>
             <a:ext cx="811981" cy="461665"/>
           </a:xfrm>
           <a:prstGeom prst="rect">
@@ -5180,7 +6543,7 @@
         </p:nvCxnSpPr>
         <p:spPr>
           <a:xfrm>
-            <a:off x="1607886" y="1587422"/>
+            <a:off x="2268273" y="1011700"/>
             <a:ext cx="495153" cy="2381399"/>
           </a:xfrm>
           <a:prstGeom prst="line">
@@ -5218,7 +6581,7 @@
         </p:nvCxnSpPr>
         <p:spPr>
           <a:xfrm flipH="1">
-            <a:off x="4400636" y="1587422"/>
+            <a:off x="5061023" y="1011700"/>
             <a:ext cx="477066" cy="3780445"/>
           </a:xfrm>
           <a:prstGeom prst="line">
@@ -5253,8 +6616,8 @@
         </p:nvSpPr>
         <p:spPr>
           <a:xfrm>
-            <a:off x="5102452" y="3435924"/>
-            <a:ext cx="1450747" cy="923330"/>
+            <a:off x="5563585" y="2860202"/>
+            <a:ext cx="1650002" cy="923330"/>
           </a:xfrm>
           <a:prstGeom prst="rect">
             <a:avLst/>
@@ -5270,8 +6633,9 @@
             <a:pPr algn="ctr"/>
             <a:r>
               <a:rPr lang="en-US" dirty="0" smtClean="0"/>
-              <a:t>Area Cleared </a:t>
-            </a:r>
+              <a:t>Region to Clear </a:t>
+            </a:r>
+            <a:endParaRPr lang="en-US" dirty="0" smtClean="0"/>
           </a:p>
           <a:p>
             <a:pPr algn="ctr"/>
@@ -5293,7 +6657,7 @@
         </p:nvCxnSpPr>
         <p:spPr>
           <a:xfrm flipH="1">
-            <a:off x="2178372" y="3506056"/>
+            <a:off x="2838759" y="2930334"/>
             <a:ext cx="205671" cy="345756"/>
           </a:xfrm>
           <a:prstGeom prst="line">
@@ -5324,7 +6688,7 @@
         </p:nvSpPr>
         <p:spPr>
           <a:xfrm>
-            <a:off x="8029564" y="2217854"/>
+            <a:off x="8283559" y="1642132"/>
             <a:ext cx="811981" cy="461665"/>
           </a:xfrm>
           <a:prstGeom prst="rect">
@@ -5367,7 +6731,7 @@
         </p:nvSpPr>
         <p:spPr>
           <a:xfrm>
-            <a:off x="8029564" y="4706807"/>
+            <a:off x="8283559" y="4198817"/>
             <a:ext cx="1114436" cy="461665"/>
           </a:xfrm>
           <a:prstGeom prst="rect">
@@ -5402,6 +6766,804 @@
           </a:p>
         </p:txBody>
       </p:sp>
+      <p:sp>
+        <p:nvSpPr>
+          <p:cNvPr id="66" name="TextBox 65"/>
+          <p:cNvSpPr txBox="1"/>
+          <p:nvPr/>
+        </p:nvSpPr>
+        <p:spPr>
+          <a:xfrm>
+            <a:off x="1561279" y="5056882"/>
+            <a:ext cx="1764808" cy="923330"/>
+          </a:xfrm>
+          <a:prstGeom prst="rect">
+            <a:avLst/>
+          </a:prstGeom>
+          <a:noFill/>
+        </p:spPr>
+        <p:txBody>
+          <a:bodyPr wrap="square" rtlCol="0">
+            <a:spAutoFit/>
+          </a:bodyPr>
+          <a:lstStyle/>
+          <a:p>
+            <a:pPr algn="ctr"/>
+            <a:r>
+              <a:rPr lang="en-US" dirty="0" smtClean="0"/>
+              <a:t>Region </a:t>
+            </a:r>
+            <a:r>
+              <a:rPr lang="en-US" dirty="0" smtClean="0"/>
+              <a:t>Cleared </a:t>
+            </a:r>
+          </a:p>
+          <a:p>
+            <a:pPr algn="ctr"/>
+            <a:r>
+              <a:rPr lang="en-US" dirty="0" smtClean="0"/>
+              <a:t>of Mosquitos</a:t>
+            </a:r>
+          </a:p>
+          <a:p>
+            <a:endParaRPr lang="en-US" dirty="0"/>
+          </a:p>
+        </p:txBody>
+      </p:sp>
+      <p:grpSp>
+        <p:nvGrpSpPr>
+          <p:cNvPr id="33" name="Group 32"/>
+          <p:cNvGrpSpPr/>
+          <p:nvPr/>
+        </p:nvGrpSpPr>
+        <p:grpSpPr>
+          <a:xfrm>
+            <a:off x="151465" y="3643570"/>
+            <a:ext cx="2760960" cy="711010"/>
+            <a:chOff x="151465" y="3643570"/>
+            <a:chExt cx="2760960" cy="711010"/>
+          </a:xfrm>
+          <a:solidFill>
+            <a:schemeClr val="bg1"/>
+          </a:solidFill>
+        </p:grpSpPr>
+        <p:sp>
+          <p:nvSpPr>
+            <p:cNvPr id="136" name="Oval 135"/>
+            <p:cNvSpPr/>
+            <p:nvPr/>
+          </p:nvSpPr>
+          <p:spPr>
+            <a:xfrm>
+              <a:off x="2866706" y="3643570"/>
+              <a:ext cx="45719" cy="45719"/>
+            </a:xfrm>
+            <a:prstGeom prst="ellipse">
+              <a:avLst/>
+            </a:prstGeom>
+            <a:grpFill/>
+            <a:ln>
+              <a:solidFill>
+                <a:schemeClr val="bg1">
+                  <a:lumMod val="85000"/>
+                </a:schemeClr>
+              </a:solidFill>
+            </a:ln>
+          </p:spPr>
+          <p:style>
+            <a:lnRef idx="1">
+              <a:schemeClr val="accent2"/>
+            </a:lnRef>
+            <a:fillRef idx="3">
+              <a:schemeClr val="accent2"/>
+            </a:fillRef>
+            <a:effectRef idx="2">
+              <a:schemeClr val="accent2"/>
+            </a:effectRef>
+            <a:fontRef idx="minor">
+              <a:schemeClr val="lt1"/>
+            </a:fontRef>
+          </p:style>
+          <p:txBody>
+            <a:bodyPr rtlCol="0" anchor="ctr"/>
+            <a:lstStyle/>
+            <a:p>
+              <a:pPr algn="ctr"/>
+              <a:endParaRPr lang="en-US"/>
+            </a:p>
+          </p:txBody>
+        </p:sp>
+        <p:sp>
+          <p:nvSpPr>
+            <p:cNvPr id="137" name="Oval 136"/>
+            <p:cNvSpPr/>
+            <p:nvPr/>
+          </p:nvSpPr>
+          <p:spPr>
+            <a:xfrm>
+              <a:off x="2866706" y="4002550"/>
+              <a:ext cx="45719" cy="45719"/>
+            </a:xfrm>
+            <a:prstGeom prst="ellipse">
+              <a:avLst/>
+            </a:prstGeom>
+            <a:grpFill/>
+            <a:ln>
+              <a:solidFill>
+                <a:schemeClr val="bg1">
+                  <a:lumMod val="85000"/>
+                </a:schemeClr>
+              </a:solidFill>
+            </a:ln>
+          </p:spPr>
+          <p:style>
+            <a:lnRef idx="1">
+              <a:schemeClr val="accent2"/>
+            </a:lnRef>
+            <a:fillRef idx="3">
+              <a:schemeClr val="accent2"/>
+            </a:fillRef>
+            <a:effectRef idx="2">
+              <a:schemeClr val="accent2"/>
+            </a:effectRef>
+            <a:fontRef idx="minor">
+              <a:schemeClr val="lt1"/>
+            </a:fontRef>
+          </p:style>
+          <p:txBody>
+            <a:bodyPr rtlCol="0" anchor="ctr"/>
+            <a:lstStyle/>
+            <a:p>
+              <a:pPr algn="ctr"/>
+              <a:endParaRPr lang="en-US"/>
+            </a:p>
+          </p:txBody>
+        </p:sp>
+        <p:sp>
+          <p:nvSpPr>
+            <p:cNvPr id="140" name="Oval 139"/>
+            <p:cNvSpPr/>
+            <p:nvPr/>
+          </p:nvSpPr>
+          <p:spPr>
+            <a:xfrm>
+              <a:off x="2479972" y="3837816"/>
+              <a:ext cx="45719" cy="45719"/>
+            </a:xfrm>
+            <a:prstGeom prst="ellipse">
+              <a:avLst/>
+            </a:prstGeom>
+            <a:grpFill/>
+            <a:ln>
+              <a:solidFill>
+                <a:schemeClr val="bg1">
+                  <a:lumMod val="85000"/>
+                </a:schemeClr>
+              </a:solidFill>
+            </a:ln>
+          </p:spPr>
+          <p:style>
+            <a:lnRef idx="1">
+              <a:schemeClr val="accent2"/>
+            </a:lnRef>
+            <a:fillRef idx="3">
+              <a:schemeClr val="accent2"/>
+            </a:fillRef>
+            <a:effectRef idx="2">
+              <a:schemeClr val="accent2"/>
+            </a:effectRef>
+            <a:fontRef idx="minor">
+              <a:schemeClr val="lt1"/>
+            </a:fontRef>
+          </p:style>
+          <p:txBody>
+            <a:bodyPr rtlCol="0" anchor="ctr"/>
+            <a:lstStyle/>
+            <a:p>
+              <a:pPr algn="ctr"/>
+              <a:endParaRPr lang="en-US"/>
+            </a:p>
+          </p:txBody>
+        </p:sp>
+        <p:sp>
+          <p:nvSpPr>
+            <p:cNvPr id="141" name="Oval 140"/>
+            <p:cNvSpPr/>
+            <p:nvPr/>
+          </p:nvSpPr>
+          <p:spPr>
+            <a:xfrm>
+              <a:off x="2479972" y="4196796"/>
+              <a:ext cx="45719" cy="45719"/>
+            </a:xfrm>
+            <a:prstGeom prst="ellipse">
+              <a:avLst/>
+            </a:prstGeom>
+            <a:grpFill/>
+            <a:ln>
+              <a:solidFill>
+                <a:schemeClr val="bg1">
+                  <a:lumMod val="85000"/>
+                </a:schemeClr>
+              </a:solidFill>
+            </a:ln>
+          </p:spPr>
+          <p:style>
+            <a:lnRef idx="1">
+              <a:schemeClr val="accent2"/>
+            </a:lnRef>
+            <a:fillRef idx="3">
+              <a:schemeClr val="accent2"/>
+            </a:fillRef>
+            <a:effectRef idx="2">
+              <a:schemeClr val="accent2"/>
+            </a:effectRef>
+            <a:fontRef idx="minor">
+              <a:schemeClr val="lt1"/>
+            </a:fontRef>
+          </p:style>
+          <p:txBody>
+            <a:bodyPr rtlCol="0" anchor="ctr"/>
+            <a:lstStyle/>
+            <a:p>
+              <a:pPr algn="ctr"/>
+              <a:endParaRPr lang="en-US"/>
+            </a:p>
+          </p:txBody>
+        </p:sp>
+        <p:sp>
+          <p:nvSpPr>
+            <p:cNvPr id="144" name="Oval 143"/>
+            <p:cNvSpPr/>
+            <p:nvPr/>
+          </p:nvSpPr>
+          <p:spPr>
+            <a:xfrm>
+              <a:off x="2093238" y="3949881"/>
+              <a:ext cx="45719" cy="45719"/>
+            </a:xfrm>
+            <a:prstGeom prst="ellipse">
+              <a:avLst/>
+            </a:prstGeom>
+            <a:grpFill/>
+            <a:ln>
+              <a:solidFill>
+                <a:schemeClr val="bg1">
+                  <a:lumMod val="85000"/>
+                </a:schemeClr>
+              </a:solidFill>
+            </a:ln>
+          </p:spPr>
+          <p:style>
+            <a:lnRef idx="1">
+              <a:schemeClr val="accent2"/>
+            </a:lnRef>
+            <a:fillRef idx="3">
+              <a:schemeClr val="accent2"/>
+            </a:fillRef>
+            <a:effectRef idx="2">
+              <a:schemeClr val="accent2"/>
+            </a:effectRef>
+            <a:fontRef idx="minor">
+              <a:schemeClr val="lt1"/>
+            </a:fontRef>
+          </p:style>
+          <p:txBody>
+            <a:bodyPr rtlCol="0" anchor="ctr"/>
+            <a:lstStyle/>
+            <a:p>
+              <a:pPr algn="ctr"/>
+              <a:endParaRPr lang="en-US"/>
+            </a:p>
+          </p:txBody>
+        </p:sp>
+        <p:sp>
+          <p:nvSpPr>
+            <p:cNvPr id="145" name="Oval 144"/>
+            <p:cNvSpPr/>
+            <p:nvPr/>
+          </p:nvSpPr>
+          <p:spPr>
+            <a:xfrm>
+              <a:off x="2093238" y="4308861"/>
+              <a:ext cx="45719" cy="45719"/>
+            </a:xfrm>
+            <a:prstGeom prst="ellipse">
+              <a:avLst/>
+            </a:prstGeom>
+            <a:grpFill/>
+            <a:ln>
+              <a:solidFill>
+                <a:schemeClr val="bg1">
+                  <a:lumMod val="85000"/>
+                </a:schemeClr>
+              </a:solidFill>
+            </a:ln>
+          </p:spPr>
+          <p:style>
+            <a:lnRef idx="1">
+              <a:schemeClr val="accent2"/>
+            </a:lnRef>
+            <a:fillRef idx="3">
+              <a:schemeClr val="accent2"/>
+            </a:fillRef>
+            <a:effectRef idx="2">
+              <a:schemeClr val="accent2"/>
+            </a:effectRef>
+            <a:fontRef idx="minor">
+              <a:schemeClr val="lt1"/>
+            </a:fontRef>
+          </p:style>
+          <p:txBody>
+            <a:bodyPr rtlCol="0" anchor="ctr"/>
+            <a:lstStyle/>
+            <a:p>
+              <a:pPr algn="ctr"/>
+              <a:endParaRPr lang="en-US"/>
+            </a:p>
+          </p:txBody>
+        </p:sp>
+        <p:sp>
+          <p:nvSpPr>
+            <p:cNvPr id="148" name="Oval 147"/>
+            <p:cNvSpPr/>
+            <p:nvPr/>
+          </p:nvSpPr>
+          <p:spPr>
+            <a:xfrm>
+              <a:off x="1698401" y="3945650"/>
+              <a:ext cx="45719" cy="45719"/>
+            </a:xfrm>
+            <a:prstGeom prst="ellipse">
+              <a:avLst/>
+            </a:prstGeom>
+            <a:grpFill/>
+            <a:ln>
+              <a:solidFill>
+                <a:schemeClr val="bg1">
+                  <a:lumMod val="85000"/>
+                </a:schemeClr>
+              </a:solidFill>
+            </a:ln>
+          </p:spPr>
+          <p:style>
+            <a:lnRef idx="1">
+              <a:schemeClr val="accent2"/>
+            </a:lnRef>
+            <a:fillRef idx="3">
+              <a:schemeClr val="accent2"/>
+            </a:fillRef>
+            <a:effectRef idx="2">
+              <a:schemeClr val="accent2"/>
+            </a:effectRef>
+            <a:fontRef idx="minor">
+              <a:schemeClr val="lt1"/>
+            </a:fontRef>
+          </p:style>
+          <p:txBody>
+            <a:bodyPr rtlCol="0" anchor="ctr"/>
+            <a:lstStyle/>
+            <a:p>
+              <a:pPr algn="ctr"/>
+              <a:endParaRPr lang="en-US"/>
+            </a:p>
+          </p:txBody>
+        </p:sp>
+        <p:sp>
+          <p:nvSpPr>
+            <p:cNvPr id="149" name="Oval 148"/>
+            <p:cNvSpPr/>
+            <p:nvPr/>
+          </p:nvSpPr>
+          <p:spPr>
+            <a:xfrm>
+              <a:off x="1698401" y="4304630"/>
+              <a:ext cx="45719" cy="45719"/>
+            </a:xfrm>
+            <a:prstGeom prst="ellipse">
+              <a:avLst/>
+            </a:prstGeom>
+            <a:grpFill/>
+            <a:ln>
+              <a:solidFill>
+                <a:schemeClr val="bg1">
+                  <a:lumMod val="85000"/>
+                </a:schemeClr>
+              </a:solidFill>
+            </a:ln>
+          </p:spPr>
+          <p:style>
+            <a:lnRef idx="1">
+              <a:schemeClr val="accent2"/>
+            </a:lnRef>
+            <a:fillRef idx="3">
+              <a:schemeClr val="accent2"/>
+            </a:fillRef>
+            <a:effectRef idx="2">
+              <a:schemeClr val="accent2"/>
+            </a:effectRef>
+            <a:fontRef idx="minor">
+              <a:schemeClr val="lt1"/>
+            </a:fontRef>
+          </p:style>
+          <p:txBody>
+            <a:bodyPr rtlCol="0" anchor="ctr"/>
+            <a:lstStyle/>
+            <a:p>
+              <a:pPr algn="ctr"/>
+              <a:endParaRPr lang="en-US"/>
+            </a:p>
+          </p:txBody>
+        </p:sp>
+        <p:sp>
+          <p:nvSpPr>
+            <p:cNvPr id="152" name="Oval 151"/>
+            <p:cNvSpPr/>
+            <p:nvPr/>
+          </p:nvSpPr>
+          <p:spPr>
+            <a:xfrm>
+              <a:off x="1311667" y="3945650"/>
+              <a:ext cx="45719" cy="45719"/>
+            </a:xfrm>
+            <a:prstGeom prst="ellipse">
+              <a:avLst/>
+            </a:prstGeom>
+            <a:grpFill/>
+            <a:ln>
+              <a:solidFill>
+                <a:schemeClr val="bg1">
+                  <a:lumMod val="85000"/>
+                </a:schemeClr>
+              </a:solidFill>
+            </a:ln>
+          </p:spPr>
+          <p:style>
+            <a:lnRef idx="1">
+              <a:schemeClr val="accent2"/>
+            </a:lnRef>
+            <a:fillRef idx="3">
+              <a:schemeClr val="accent2"/>
+            </a:fillRef>
+            <a:effectRef idx="2">
+              <a:schemeClr val="accent2"/>
+            </a:effectRef>
+            <a:fontRef idx="minor">
+              <a:schemeClr val="lt1"/>
+            </a:fontRef>
+          </p:style>
+          <p:txBody>
+            <a:bodyPr rtlCol="0" anchor="ctr"/>
+            <a:lstStyle/>
+            <a:p>
+              <a:pPr algn="ctr"/>
+              <a:endParaRPr lang="en-US"/>
+            </a:p>
+          </p:txBody>
+        </p:sp>
+        <p:sp>
+          <p:nvSpPr>
+            <p:cNvPr id="153" name="Oval 152"/>
+            <p:cNvSpPr/>
+            <p:nvPr/>
+          </p:nvSpPr>
+          <p:spPr>
+            <a:xfrm>
+              <a:off x="1311667" y="4304630"/>
+              <a:ext cx="45719" cy="45719"/>
+            </a:xfrm>
+            <a:prstGeom prst="ellipse">
+              <a:avLst/>
+            </a:prstGeom>
+            <a:grpFill/>
+            <a:ln>
+              <a:solidFill>
+                <a:schemeClr val="bg1">
+                  <a:lumMod val="85000"/>
+                </a:schemeClr>
+              </a:solidFill>
+            </a:ln>
+          </p:spPr>
+          <p:style>
+            <a:lnRef idx="1">
+              <a:schemeClr val="accent2"/>
+            </a:lnRef>
+            <a:fillRef idx="3">
+              <a:schemeClr val="accent2"/>
+            </a:fillRef>
+            <a:effectRef idx="2">
+              <a:schemeClr val="accent2"/>
+            </a:effectRef>
+            <a:fontRef idx="minor">
+              <a:schemeClr val="lt1"/>
+            </a:fontRef>
+          </p:style>
+          <p:txBody>
+            <a:bodyPr rtlCol="0" anchor="ctr"/>
+            <a:lstStyle/>
+            <a:p>
+              <a:pPr algn="ctr"/>
+              <a:endParaRPr lang="en-US"/>
+            </a:p>
+          </p:txBody>
+        </p:sp>
+        <p:sp>
+          <p:nvSpPr>
+            <p:cNvPr id="156" name="Oval 155"/>
+            <p:cNvSpPr/>
+            <p:nvPr/>
+          </p:nvSpPr>
+          <p:spPr>
+            <a:xfrm>
+              <a:off x="924933" y="3945650"/>
+              <a:ext cx="45719" cy="45719"/>
+            </a:xfrm>
+            <a:prstGeom prst="ellipse">
+              <a:avLst/>
+            </a:prstGeom>
+            <a:grpFill/>
+            <a:ln>
+              <a:solidFill>
+                <a:schemeClr val="bg1">
+                  <a:lumMod val="85000"/>
+                </a:schemeClr>
+              </a:solidFill>
+            </a:ln>
+          </p:spPr>
+          <p:style>
+            <a:lnRef idx="1">
+              <a:schemeClr val="accent2"/>
+            </a:lnRef>
+            <a:fillRef idx="3">
+              <a:schemeClr val="accent2"/>
+            </a:fillRef>
+            <a:effectRef idx="2">
+              <a:schemeClr val="accent2"/>
+            </a:effectRef>
+            <a:fontRef idx="minor">
+              <a:schemeClr val="lt1"/>
+            </a:fontRef>
+          </p:style>
+          <p:txBody>
+            <a:bodyPr rtlCol="0" anchor="ctr"/>
+            <a:lstStyle/>
+            <a:p>
+              <a:pPr algn="ctr"/>
+              <a:endParaRPr lang="en-US"/>
+            </a:p>
+          </p:txBody>
+        </p:sp>
+        <p:sp>
+          <p:nvSpPr>
+            <p:cNvPr id="157" name="Oval 156"/>
+            <p:cNvSpPr/>
+            <p:nvPr/>
+          </p:nvSpPr>
+          <p:spPr>
+            <a:xfrm>
+              <a:off x="924933" y="4304630"/>
+              <a:ext cx="45719" cy="45719"/>
+            </a:xfrm>
+            <a:prstGeom prst="ellipse">
+              <a:avLst/>
+            </a:prstGeom>
+            <a:grpFill/>
+            <a:ln>
+              <a:solidFill>
+                <a:schemeClr val="bg1">
+                  <a:lumMod val="85000"/>
+                </a:schemeClr>
+              </a:solidFill>
+            </a:ln>
+          </p:spPr>
+          <p:style>
+            <a:lnRef idx="1">
+              <a:schemeClr val="accent2"/>
+            </a:lnRef>
+            <a:fillRef idx="3">
+              <a:schemeClr val="accent2"/>
+            </a:fillRef>
+            <a:effectRef idx="2">
+              <a:schemeClr val="accent2"/>
+            </a:effectRef>
+            <a:fontRef idx="minor">
+              <a:schemeClr val="lt1"/>
+            </a:fontRef>
+          </p:style>
+          <p:txBody>
+            <a:bodyPr rtlCol="0" anchor="ctr"/>
+            <a:lstStyle/>
+            <a:p>
+              <a:pPr algn="ctr"/>
+              <a:endParaRPr lang="en-US"/>
+            </a:p>
+          </p:txBody>
+        </p:sp>
+        <p:sp>
+          <p:nvSpPr>
+            <p:cNvPr id="160" name="Oval 159"/>
+            <p:cNvSpPr/>
+            <p:nvPr/>
+          </p:nvSpPr>
+          <p:spPr>
+            <a:xfrm>
+              <a:off x="538199" y="3945650"/>
+              <a:ext cx="45719" cy="45719"/>
+            </a:xfrm>
+            <a:prstGeom prst="ellipse">
+              <a:avLst/>
+            </a:prstGeom>
+            <a:grpFill/>
+            <a:ln>
+              <a:solidFill>
+                <a:schemeClr val="bg1">
+                  <a:lumMod val="85000"/>
+                </a:schemeClr>
+              </a:solidFill>
+            </a:ln>
+          </p:spPr>
+          <p:style>
+            <a:lnRef idx="1">
+              <a:schemeClr val="accent2"/>
+            </a:lnRef>
+            <a:fillRef idx="3">
+              <a:schemeClr val="accent2"/>
+            </a:fillRef>
+            <a:effectRef idx="2">
+              <a:schemeClr val="accent2"/>
+            </a:effectRef>
+            <a:fontRef idx="minor">
+              <a:schemeClr val="lt1"/>
+            </a:fontRef>
+          </p:style>
+          <p:txBody>
+            <a:bodyPr rtlCol="0" anchor="ctr"/>
+            <a:lstStyle/>
+            <a:p>
+              <a:pPr algn="ctr"/>
+              <a:endParaRPr lang="en-US"/>
+            </a:p>
+          </p:txBody>
+        </p:sp>
+        <p:sp>
+          <p:nvSpPr>
+            <p:cNvPr id="161" name="Oval 160"/>
+            <p:cNvSpPr/>
+            <p:nvPr/>
+          </p:nvSpPr>
+          <p:spPr>
+            <a:xfrm>
+              <a:off x="538199" y="4304630"/>
+              <a:ext cx="45719" cy="45719"/>
+            </a:xfrm>
+            <a:prstGeom prst="ellipse">
+              <a:avLst/>
+            </a:prstGeom>
+            <a:grpFill/>
+            <a:ln>
+              <a:solidFill>
+                <a:schemeClr val="bg1">
+                  <a:lumMod val="85000"/>
+                </a:schemeClr>
+              </a:solidFill>
+            </a:ln>
+          </p:spPr>
+          <p:style>
+            <a:lnRef idx="1">
+              <a:schemeClr val="accent2"/>
+            </a:lnRef>
+            <a:fillRef idx="3">
+              <a:schemeClr val="accent2"/>
+            </a:fillRef>
+            <a:effectRef idx="2">
+              <a:schemeClr val="accent2"/>
+            </a:effectRef>
+            <a:fontRef idx="minor">
+              <a:schemeClr val="lt1"/>
+            </a:fontRef>
+          </p:style>
+          <p:txBody>
+            <a:bodyPr rtlCol="0" anchor="ctr"/>
+            <a:lstStyle/>
+            <a:p>
+              <a:pPr algn="ctr"/>
+              <a:endParaRPr lang="en-US"/>
+            </a:p>
+          </p:txBody>
+        </p:sp>
+        <p:sp>
+          <p:nvSpPr>
+            <p:cNvPr id="164" name="Oval 163"/>
+            <p:cNvSpPr/>
+            <p:nvPr/>
+          </p:nvSpPr>
+          <p:spPr>
+            <a:xfrm>
+              <a:off x="151465" y="3941419"/>
+              <a:ext cx="45719" cy="45719"/>
+            </a:xfrm>
+            <a:prstGeom prst="ellipse">
+              <a:avLst/>
+            </a:prstGeom>
+            <a:grpFill/>
+            <a:ln>
+              <a:solidFill>
+                <a:schemeClr val="bg1">
+                  <a:lumMod val="85000"/>
+                </a:schemeClr>
+              </a:solidFill>
+            </a:ln>
+          </p:spPr>
+          <p:style>
+            <a:lnRef idx="1">
+              <a:schemeClr val="accent2"/>
+            </a:lnRef>
+            <a:fillRef idx="3">
+              <a:schemeClr val="accent2"/>
+            </a:fillRef>
+            <a:effectRef idx="2">
+              <a:schemeClr val="accent2"/>
+            </a:effectRef>
+            <a:fontRef idx="minor">
+              <a:schemeClr val="lt1"/>
+            </a:fontRef>
+          </p:style>
+          <p:txBody>
+            <a:bodyPr rtlCol="0" anchor="ctr"/>
+            <a:lstStyle/>
+            <a:p>
+              <a:pPr algn="ctr"/>
+              <a:endParaRPr lang="en-US"/>
+            </a:p>
+          </p:txBody>
+        </p:sp>
+        <p:sp>
+          <p:nvSpPr>
+            <p:cNvPr id="165" name="Oval 164"/>
+            <p:cNvSpPr/>
+            <p:nvPr/>
+          </p:nvSpPr>
+          <p:spPr>
+            <a:xfrm>
+              <a:off x="151465" y="4300399"/>
+              <a:ext cx="45719" cy="45719"/>
+            </a:xfrm>
+            <a:prstGeom prst="ellipse">
+              <a:avLst/>
+            </a:prstGeom>
+            <a:grpFill/>
+            <a:ln>
+              <a:solidFill>
+                <a:schemeClr val="bg1">
+                  <a:lumMod val="85000"/>
+                </a:schemeClr>
+              </a:solidFill>
+            </a:ln>
+          </p:spPr>
+          <p:style>
+            <a:lnRef idx="1">
+              <a:schemeClr val="accent2"/>
+            </a:lnRef>
+            <a:fillRef idx="3">
+              <a:schemeClr val="accent2"/>
+            </a:fillRef>
+            <a:effectRef idx="2">
+              <a:schemeClr val="accent2"/>
+            </a:effectRef>
+            <a:fontRef idx="minor">
+              <a:schemeClr val="lt1"/>
+            </a:fontRef>
+          </p:style>
+          <p:txBody>
+            <a:bodyPr rtlCol="0" anchor="ctr"/>
+            <a:lstStyle/>
+            <a:p>
+              <a:pPr algn="ctr"/>
+              <a:endParaRPr lang="en-US"/>
+            </a:p>
+          </p:txBody>
+        </p:sp>
+      </p:grpSp>
     </p:spTree>
     <p:extLst>
       <p:ext uri="{BB962C8B-B14F-4D97-AF65-F5344CB8AC3E}">

</xml_diff>

<commit_message>
removed word 'drone' to UAV
</commit_message>
<xml_diff>
--- a/pictures/UnusedFigures/DroneConfigs.pptx
+++ b/pictures/UnusedFigures/DroneConfigs.pptx
@@ -288,7 +288,7 @@
           <a:p>
             <a:fld id="{E03162C6-0571-EE4A-B6AC-459411ED4CBB}" type="datetimeFigureOut">
               <a:rPr lang="en-US" smtClean="0"/>
-              <a:t>9/13/16</a:t>
+              <a:t>9/15/16</a:t>
             </a:fld>
             <a:endParaRPr lang="en-US"/>
           </a:p>
@@ -458,7 +458,7 @@
           <a:p>
             <a:fld id="{E03162C6-0571-EE4A-B6AC-459411ED4CBB}" type="datetimeFigureOut">
               <a:rPr lang="en-US" smtClean="0"/>
-              <a:t>9/13/16</a:t>
+              <a:t>9/15/16</a:t>
             </a:fld>
             <a:endParaRPr lang="en-US"/>
           </a:p>
@@ -638,7 +638,7 @@
           <a:p>
             <a:fld id="{E03162C6-0571-EE4A-B6AC-459411ED4CBB}" type="datetimeFigureOut">
               <a:rPr lang="en-US" smtClean="0"/>
-              <a:t>9/13/16</a:t>
+              <a:t>9/15/16</a:t>
             </a:fld>
             <a:endParaRPr lang="en-US"/>
           </a:p>
@@ -808,7 +808,7 @@
           <a:p>
             <a:fld id="{E03162C6-0571-EE4A-B6AC-459411ED4CBB}" type="datetimeFigureOut">
               <a:rPr lang="en-US" smtClean="0"/>
-              <a:t>9/13/16</a:t>
+              <a:t>9/15/16</a:t>
             </a:fld>
             <a:endParaRPr lang="en-US"/>
           </a:p>
@@ -1054,7 +1054,7 @@
           <a:p>
             <a:fld id="{E03162C6-0571-EE4A-B6AC-459411ED4CBB}" type="datetimeFigureOut">
               <a:rPr lang="en-US" smtClean="0"/>
-              <a:t>9/13/16</a:t>
+              <a:t>9/15/16</a:t>
             </a:fld>
             <a:endParaRPr lang="en-US"/>
           </a:p>
@@ -1342,7 +1342,7 @@
           <a:p>
             <a:fld id="{E03162C6-0571-EE4A-B6AC-459411ED4CBB}" type="datetimeFigureOut">
               <a:rPr lang="en-US" smtClean="0"/>
-              <a:t>9/13/16</a:t>
+              <a:t>9/15/16</a:t>
             </a:fld>
             <a:endParaRPr lang="en-US"/>
           </a:p>
@@ -1764,7 +1764,7 @@
           <a:p>
             <a:fld id="{E03162C6-0571-EE4A-B6AC-459411ED4CBB}" type="datetimeFigureOut">
               <a:rPr lang="en-US" smtClean="0"/>
-              <a:t>9/13/16</a:t>
+              <a:t>9/15/16</a:t>
             </a:fld>
             <a:endParaRPr lang="en-US"/>
           </a:p>
@@ -1882,7 +1882,7 @@
           <a:p>
             <a:fld id="{E03162C6-0571-EE4A-B6AC-459411ED4CBB}" type="datetimeFigureOut">
               <a:rPr lang="en-US" smtClean="0"/>
-              <a:t>9/13/16</a:t>
+              <a:t>9/15/16</a:t>
             </a:fld>
             <a:endParaRPr lang="en-US"/>
           </a:p>
@@ -1977,7 +1977,7 @@
           <a:p>
             <a:fld id="{E03162C6-0571-EE4A-B6AC-459411ED4CBB}" type="datetimeFigureOut">
               <a:rPr lang="en-US" smtClean="0"/>
-              <a:t>9/13/16</a:t>
+              <a:t>9/15/16</a:t>
             </a:fld>
             <a:endParaRPr lang="en-US"/>
           </a:p>
@@ -2254,7 +2254,7 @@
           <a:p>
             <a:fld id="{E03162C6-0571-EE4A-B6AC-459411ED4CBB}" type="datetimeFigureOut">
               <a:rPr lang="en-US" smtClean="0"/>
-              <a:t>9/13/16</a:t>
+              <a:t>9/15/16</a:t>
             </a:fld>
             <a:endParaRPr lang="en-US"/>
           </a:p>
@@ -2507,7 +2507,7 @@
           <a:p>
             <a:fld id="{E03162C6-0571-EE4A-B6AC-459411ED4CBB}" type="datetimeFigureOut">
               <a:rPr lang="en-US" smtClean="0"/>
-              <a:t>9/13/16</a:t>
+              <a:t>9/15/16</a:t>
             </a:fld>
             <a:endParaRPr lang="en-US"/>
           </a:p>
@@ -2720,7 +2720,7 @@
           <a:p>
             <a:fld id="{E03162C6-0571-EE4A-B6AC-459411ED4CBB}" type="datetimeFigureOut">
               <a:rPr lang="en-US" smtClean="0"/>
-              <a:t>9/13/16</a:t>
+              <a:t>9/15/16</a:t>
             </a:fld>
             <a:endParaRPr lang="en-US"/>
           </a:p>
@@ -5371,8 +5371,16 @@
           <a:p>
             <a:pPr algn="ctr"/>
             <a:r>
-              <a:rPr lang="en-US" dirty="0" smtClean="0"/>
-              <a:t>Multicopter Drone</a:t>
+              <a:rPr lang="en-US" dirty="0" err="1" smtClean="0"/>
+              <a:t>Multicopter</a:t>
+            </a:r>
+            <a:r>
+              <a:rPr lang="en-US" smtClean="0"/>
+              <a:t> </a:t>
+            </a:r>
+            <a:r>
+              <a:rPr lang="en-US" smtClean="0"/>
+              <a:t>UAV</a:t>
             </a:r>
             <a:endParaRPr lang="en-US" dirty="0"/>
           </a:p>
@@ -6635,7 +6643,6 @@
               <a:rPr lang="en-US" dirty="0" smtClean="0"/>
               <a:t>Region to Clear </a:t>
             </a:r>
-            <a:endParaRPr lang="en-US" dirty="0" smtClean="0"/>
           </a:p>
           <a:p>
             <a:pPr algn="ctr"/>
@@ -6791,11 +6798,7 @@
             <a:pPr algn="ctr"/>
             <a:r>
               <a:rPr lang="en-US" dirty="0" smtClean="0"/>
-              <a:t>Region </a:t>
-            </a:r>
-            <a:r>
-              <a:rPr lang="en-US" dirty="0" smtClean="0"/>
-              <a:t>Cleared </a:t>
+              <a:t>Region Cleared </a:t>
             </a:r>
           </a:p>
           <a:p>

</xml_diff>

<commit_message>
updated image with arrow for theta
</commit_message>
<xml_diff>
--- a/pictures/UnusedFigures/DroneConfigs.pptx
+++ b/pictures/UnusedFigures/DroneConfigs.pptx
@@ -288,7 +288,7 @@
           <a:p>
             <a:fld id="{E03162C6-0571-EE4A-B6AC-459411ED4CBB}" type="datetimeFigureOut">
               <a:rPr lang="en-US" smtClean="0"/>
-              <a:t>9/15/16</a:t>
+              <a:t>3/15/17</a:t>
             </a:fld>
             <a:endParaRPr lang="en-US"/>
           </a:p>
@@ -458,7 +458,7 @@
           <a:p>
             <a:fld id="{E03162C6-0571-EE4A-B6AC-459411ED4CBB}" type="datetimeFigureOut">
               <a:rPr lang="en-US" smtClean="0"/>
-              <a:t>9/15/16</a:t>
+              <a:t>3/15/17</a:t>
             </a:fld>
             <a:endParaRPr lang="en-US"/>
           </a:p>
@@ -638,7 +638,7 @@
           <a:p>
             <a:fld id="{E03162C6-0571-EE4A-B6AC-459411ED4CBB}" type="datetimeFigureOut">
               <a:rPr lang="en-US" smtClean="0"/>
-              <a:t>9/15/16</a:t>
+              <a:t>3/15/17</a:t>
             </a:fld>
             <a:endParaRPr lang="en-US"/>
           </a:p>
@@ -808,7 +808,7 @@
           <a:p>
             <a:fld id="{E03162C6-0571-EE4A-B6AC-459411ED4CBB}" type="datetimeFigureOut">
               <a:rPr lang="en-US" smtClean="0"/>
-              <a:t>9/15/16</a:t>
+              <a:t>3/15/17</a:t>
             </a:fld>
             <a:endParaRPr lang="en-US"/>
           </a:p>
@@ -1054,7 +1054,7 @@
           <a:p>
             <a:fld id="{E03162C6-0571-EE4A-B6AC-459411ED4CBB}" type="datetimeFigureOut">
               <a:rPr lang="en-US" smtClean="0"/>
-              <a:t>9/15/16</a:t>
+              <a:t>3/15/17</a:t>
             </a:fld>
             <a:endParaRPr lang="en-US"/>
           </a:p>
@@ -1342,7 +1342,7 @@
           <a:p>
             <a:fld id="{E03162C6-0571-EE4A-B6AC-459411ED4CBB}" type="datetimeFigureOut">
               <a:rPr lang="en-US" smtClean="0"/>
-              <a:t>9/15/16</a:t>
+              <a:t>3/15/17</a:t>
             </a:fld>
             <a:endParaRPr lang="en-US"/>
           </a:p>
@@ -1764,7 +1764,7 @@
           <a:p>
             <a:fld id="{E03162C6-0571-EE4A-B6AC-459411ED4CBB}" type="datetimeFigureOut">
               <a:rPr lang="en-US" smtClean="0"/>
-              <a:t>9/15/16</a:t>
+              <a:t>3/15/17</a:t>
             </a:fld>
             <a:endParaRPr lang="en-US"/>
           </a:p>
@@ -1882,7 +1882,7 @@
           <a:p>
             <a:fld id="{E03162C6-0571-EE4A-B6AC-459411ED4CBB}" type="datetimeFigureOut">
               <a:rPr lang="en-US" smtClean="0"/>
-              <a:t>9/15/16</a:t>
+              <a:t>3/15/17</a:t>
             </a:fld>
             <a:endParaRPr lang="en-US"/>
           </a:p>
@@ -1977,7 +1977,7 @@
           <a:p>
             <a:fld id="{E03162C6-0571-EE4A-B6AC-459411ED4CBB}" type="datetimeFigureOut">
               <a:rPr lang="en-US" smtClean="0"/>
-              <a:t>9/15/16</a:t>
+              <a:t>3/15/17</a:t>
             </a:fld>
             <a:endParaRPr lang="en-US"/>
           </a:p>
@@ -2254,7 +2254,7 @@
           <a:p>
             <a:fld id="{E03162C6-0571-EE4A-B6AC-459411ED4CBB}" type="datetimeFigureOut">
               <a:rPr lang="en-US" smtClean="0"/>
-              <a:t>9/15/16</a:t>
+              <a:t>3/15/17</a:t>
             </a:fld>
             <a:endParaRPr lang="en-US"/>
           </a:p>
@@ -2507,7 +2507,7 @@
           <a:p>
             <a:fld id="{E03162C6-0571-EE4A-B6AC-459411ED4CBB}" type="datetimeFigureOut">
               <a:rPr lang="en-US" smtClean="0"/>
-              <a:t>9/15/16</a:t>
+              <a:t>3/15/17</a:t>
             </a:fld>
             <a:endParaRPr lang="en-US"/>
           </a:p>
@@ -2720,7 +2720,7 @@
           <a:p>
             <a:fld id="{E03162C6-0571-EE4A-B6AC-459411ED4CBB}" type="datetimeFigureOut">
               <a:rPr lang="en-US" smtClean="0"/>
-              <a:t>9/15/16</a:t>
+              <a:t>3/15/17</a:t>
             </a:fld>
             <a:endParaRPr lang="en-US"/>
           </a:p>
@@ -5376,11 +5376,7 @@
             </a:r>
             <a:r>
               <a:rPr lang="en-US" smtClean="0"/>
-              <a:t> </a:t>
-            </a:r>
-            <a:r>
-              <a:rPr lang="en-US" smtClean="0"/>
-              <a:t>UAV</a:t>
+              <a:t> UAV</a:t>
             </a:r>
             <a:endParaRPr lang="en-US" dirty="0"/>
           </a:p>
@@ -7567,6 +7563,55 @@
           </p:txBody>
         </p:sp>
       </p:grpSp>
+      <p:sp>
+        <p:nvSpPr>
+          <p:cNvPr id="6" name="Arc 5"/>
+          <p:cNvSpPr/>
+          <p:nvPr/>
+        </p:nvSpPr>
+        <p:spPr>
+          <a:xfrm>
+            <a:off x="4503196" y="4024751"/>
+            <a:ext cx="2081583" cy="2081583"/>
+          </a:xfrm>
+          <a:prstGeom prst="arc">
+            <a:avLst>
+              <a:gd name="adj1" fmla="val 10913672"/>
+              <a:gd name="adj2" fmla="val 12573365"/>
+            </a:avLst>
+          </a:prstGeom>
+          <a:ln w="50800">
+            <a:solidFill>
+              <a:schemeClr val="accent1">
+                <a:lumMod val="75000"/>
+              </a:schemeClr>
+            </a:solidFill>
+            <a:tailEnd type="stealth" w="lg" len="lg"/>
+          </a:ln>
+        </p:spPr>
+        <p:style>
+          <a:lnRef idx="2">
+            <a:schemeClr val="accent1"/>
+          </a:lnRef>
+          <a:fillRef idx="0">
+            <a:schemeClr val="accent1"/>
+          </a:fillRef>
+          <a:effectRef idx="1">
+            <a:schemeClr val="accent1"/>
+          </a:effectRef>
+          <a:fontRef idx="minor">
+            <a:schemeClr val="tx1"/>
+          </a:fontRef>
+        </p:style>
+        <p:txBody>
+          <a:bodyPr rtlCol="0" anchor="ctr"/>
+          <a:lstStyle/>
+          <a:p>
+            <a:pPr algn="ctr"/>
+            <a:endParaRPr lang="en-US"/>
+          </a:p>
+        </p:txBody>
+      </p:sp>
     </p:spTree>
     <p:extLst>
       <p:ext uri="{BB962C8B-B14F-4D97-AF65-F5344CB8AC3E}">

</xml_diff>